<commit_message>
pytesseract >> EasyOCR >> PyPDF, PyMuPDF 까지 작업 완료 PPT는 더 작업하기
</commit_message>
<xml_diff>
--- a/PPT/진짜 준비자료.pptx
+++ b/PPT/진짜 준비자료.pptx
@@ -5,14 +5,16 @@
     <p:sldMasterId id="2147483648" r:id="rId1"/>
   </p:sldMasterIdLst>
   <p:notesMasterIdLst>
-    <p:notesMasterId r:id="rId7"/>
+    <p:notesMasterId r:id="rId9"/>
   </p:notesMasterIdLst>
   <p:sldIdLst>
     <p:sldId id="256" r:id="rId2"/>
     <p:sldId id="257" r:id="rId3"/>
     <p:sldId id="258" r:id="rId4"/>
-    <p:sldId id="259" r:id="rId5"/>
-    <p:sldId id="260" r:id="rId6"/>
+    <p:sldId id="261" r:id="rId5"/>
+    <p:sldId id="262" r:id="rId6"/>
+    <p:sldId id="263" r:id="rId7"/>
+    <p:sldId id="264" r:id="rId8"/>
   </p:sldIdLst>
   <p:sldSz cx="12192000" cy="6858000"/>
   <p:notesSz cx="6858000" cy="9144000"/>
@@ -114,7 +116,7 @@
   <p:extLst>
     <p:ext uri="{EFAFB233-063F-42B5-8137-9DF3F51BA10A}">
       <p15:sldGuideLst xmlns:p15="http://schemas.microsoft.com/office/powerpoint/2012/main">
-        <p15:guide id="1" pos="3840" userDrawn="1">
+        <p15:guide id="1" pos="665" userDrawn="1">
           <p15:clr>
             <a:srgbClr val="A4A3A4"/>
           </p15:clr>
@@ -125,6 +127,9 @@
           </p15:clr>
         </p15:guide>
       </p15:sldGuideLst>
+    </p:ext>
+    <p:ext uri="{2D200454-40CA-4A62-9FC3-DE9A4176ACB9}">
+      <p15:notesGuideLst xmlns:p15="http://schemas.microsoft.com/office/powerpoint/2012/main"/>
     </p:ext>
   </p:extLst>
 </p:presentation>
@@ -2511,7 +2516,7 @@
               <a:pPr/>
               <a:t>‹#›</a:t>
             </a:fld>
-            <a:endParaRPr lang="ko-KR" altLang="en-US"/>
+            <a:endParaRPr lang="ko-KR" altLang="en-US" dirty="0"/>
           </a:p>
         </p:txBody>
       </p:sp>
@@ -4346,84 +4351,6 @@
           </a:p>
         </p:txBody>
       </p:sp>
-      <p:sp>
-        <p:nvSpPr>
-          <p:cNvPr id="33" name="TextBox 10">
-            <a:extLst>
-              <a:ext uri="{FF2B5EF4-FFF2-40B4-BE49-F238E27FC236}">
-                <a16:creationId xmlns:a16="http://schemas.microsoft.com/office/drawing/2014/main" id="{B346EA75-28FE-33C7-6D7C-16239D4DFC1D}"/>
-              </a:ext>
-            </a:extLst>
-          </p:cNvPr>
-          <p:cNvSpPr txBox="1"/>
-          <p:nvPr/>
-        </p:nvSpPr>
-        <p:spPr>
-          <a:xfrm>
-            <a:off x="7158703" y="6772275"/>
-            <a:ext cx="11493500" cy="660400"/>
-          </a:xfrm>
-          <a:prstGeom prst="rect">
-            <a:avLst/>
-          </a:prstGeom>
-        </p:spPr>
-        <p:txBody>
-          <a:bodyPr lIns="0" tIns="47413" rIns="0" bIns="47413" rtlCol="0" anchor="ctr"/>
-          <a:lstStyle/>
-          <a:p>
-            <a:pPr lvl="0" algn="l">
-              <a:lnSpc>
-                <a:spcPct val="99600"/>
-              </a:lnSpc>
-            </a:pPr>
-            <a:r>
-              <a:rPr lang="ko-KR" altLang="en-US" sz="3733" b="0" i="0" u="none" strike="noStrike" dirty="0">
-                <a:solidFill>
-                  <a:srgbClr val="000000"/>
-                </a:solidFill>
-                <a:ea typeface="Pretendard SemiBold"/>
-              </a:rPr>
-              <a:t>결론 및 향후 방향성 </a:t>
-            </a:r>
-            <a:endParaRPr lang="en-US" sz="3733" b="0" i="0" u="none" strike="noStrike" dirty="0">
-              <a:solidFill>
-                <a:srgbClr val="000000"/>
-              </a:solidFill>
-              <a:latin typeface="Pretendard SemiBold"/>
-            </a:endParaRPr>
-          </a:p>
-        </p:txBody>
-      </p:sp>
-      <p:pic>
-        <p:nvPicPr>
-          <p:cNvPr id="34" name="Picture 11">
-            <a:extLst>
-              <a:ext uri="{FF2B5EF4-FFF2-40B4-BE49-F238E27FC236}">
-                <a16:creationId xmlns:a16="http://schemas.microsoft.com/office/drawing/2014/main" id="{FD822AA1-A0C3-5940-415F-891FF231CA94}"/>
-              </a:ext>
-            </a:extLst>
-          </p:cNvPr>
-          <p:cNvPicPr>
-            <a:picLocks noChangeAspect="1"/>
-          </p:cNvPicPr>
-          <p:nvPr/>
-        </p:nvPicPr>
-        <p:blipFill>
-          <a:blip r:embed="rId2"/>
-          <a:stretch>
-            <a:fillRect/>
-          </a:stretch>
-        </p:blipFill>
-        <p:spPr>
-          <a:xfrm>
-            <a:off x="4999703" y="6518275"/>
-            <a:ext cx="1346200" cy="1155700"/>
-          </a:xfrm>
-          <a:prstGeom prst="rect">
-            <a:avLst/>
-          </a:prstGeom>
-        </p:spPr>
-      </p:pic>
       <p:grpSp>
         <p:nvGrpSpPr>
           <p:cNvPr id="61" name="그룹 60">
@@ -4533,385 +4460,6 @@
           </p:txBody>
         </p:sp>
       </p:grpSp>
-      <p:sp>
-        <p:nvSpPr>
-          <p:cNvPr id="37" name="TextBox 15">
-            <a:extLst>
-              <a:ext uri="{FF2B5EF4-FFF2-40B4-BE49-F238E27FC236}">
-                <a16:creationId xmlns:a16="http://schemas.microsoft.com/office/drawing/2014/main" id="{C70818A1-263E-329B-2412-8CAE466EAE63}"/>
-              </a:ext>
-            </a:extLst>
-          </p:cNvPr>
-          <p:cNvSpPr txBox="1"/>
-          <p:nvPr/>
-        </p:nvSpPr>
-        <p:spPr>
-          <a:xfrm>
-            <a:off x="7171403" y="-923925"/>
-            <a:ext cx="11493500" cy="660400"/>
-          </a:xfrm>
-          <a:prstGeom prst="rect">
-            <a:avLst/>
-          </a:prstGeom>
-        </p:spPr>
-        <p:txBody>
-          <a:bodyPr lIns="0" tIns="47413" rIns="0" bIns="47413" rtlCol="0" anchor="ctr"/>
-          <a:lstStyle/>
-          <a:p>
-            <a:pPr lvl="0" algn="l">
-              <a:lnSpc>
-                <a:spcPct val="99600"/>
-              </a:lnSpc>
-            </a:pPr>
-            <a:r>
-              <a:rPr lang="ko-KR" altLang="en-US" sz="3733" b="0" i="0" u="none" strike="noStrike" dirty="0">
-                <a:solidFill>
-                  <a:srgbClr val="000000"/>
-                </a:solidFill>
-                <a:latin typeface="Pretendard SemiBold"/>
-                <a:ea typeface="Pretendard SemiBold"/>
-              </a:rPr>
-              <a:t>주제 선택 배경</a:t>
-            </a:r>
-            <a:endParaRPr lang="en-US" sz="3733" b="0" i="0" u="none" strike="noStrike" dirty="0">
-              <a:solidFill>
-                <a:srgbClr val="000000"/>
-              </a:solidFill>
-              <a:latin typeface="Pretendard SemiBold"/>
-            </a:endParaRPr>
-          </a:p>
-        </p:txBody>
-      </p:sp>
-      <p:pic>
-        <p:nvPicPr>
-          <p:cNvPr id="38" name="Picture 16">
-            <a:extLst>
-              <a:ext uri="{FF2B5EF4-FFF2-40B4-BE49-F238E27FC236}">
-                <a16:creationId xmlns:a16="http://schemas.microsoft.com/office/drawing/2014/main" id="{6D96E547-DA2C-360B-0EE8-AF0754DFAF9D}"/>
-              </a:ext>
-            </a:extLst>
-          </p:cNvPr>
-          <p:cNvPicPr>
-            <a:picLocks noChangeAspect="1"/>
-          </p:cNvPicPr>
-          <p:nvPr/>
-        </p:nvPicPr>
-        <p:blipFill>
-          <a:blip r:embed="rId3"/>
-          <a:stretch>
-            <a:fillRect/>
-          </a:stretch>
-        </p:blipFill>
-        <p:spPr>
-          <a:xfrm>
-            <a:off x="5012403" y="-1177925"/>
-            <a:ext cx="1346200" cy="1155700"/>
-          </a:xfrm>
-          <a:prstGeom prst="rect">
-            <a:avLst/>
-          </a:prstGeom>
-        </p:spPr>
-      </p:pic>
-      <p:sp>
-        <p:nvSpPr>
-          <p:cNvPr id="39" name="TextBox 17">
-            <a:extLst>
-              <a:ext uri="{FF2B5EF4-FFF2-40B4-BE49-F238E27FC236}">
-                <a16:creationId xmlns:a16="http://schemas.microsoft.com/office/drawing/2014/main" id="{8B2CC752-3005-1112-F6A4-9B3833920961}"/>
-              </a:ext>
-            </a:extLst>
-          </p:cNvPr>
-          <p:cNvSpPr txBox="1"/>
-          <p:nvPr/>
-        </p:nvSpPr>
-        <p:spPr>
-          <a:xfrm>
-            <a:off x="7171403" y="993775"/>
-            <a:ext cx="11493500" cy="660400"/>
-          </a:xfrm>
-          <a:prstGeom prst="rect">
-            <a:avLst/>
-          </a:prstGeom>
-        </p:spPr>
-        <p:txBody>
-          <a:bodyPr lIns="0" tIns="47413" rIns="0" bIns="47413" rtlCol="0" anchor="ctr"/>
-          <a:lstStyle/>
-          <a:p>
-            <a:pPr lvl="0" algn="l">
-              <a:lnSpc>
-                <a:spcPct val="99600"/>
-              </a:lnSpc>
-            </a:pPr>
-            <a:r>
-              <a:rPr lang="en-US" altLang="ko-KR" sz="3733" b="0" i="0" u="none" strike="noStrike" dirty="0">
-                <a:solidFill>
-                  <a:srgbClr val="000000"/>
-                </a:solidFill>
-                <a:latin typeface="Pretendard Bold" panose="020B0600000101010101" charset="-127"/>
-                <a:ea typeface="Pretendard Bold" panose="020B0600000101010101" charset="-127"/>
-              </a:rPr>
-              <a:t>OCR</a:t>
-            </a:r>
-            <a:r>
-              <a:rPr lang="ko-KR" altLang="en-US" sz="3733" b="0" i="0" u="none" strike="noStrike" dirty="0">
-                <a:solidFill>
-                  <a:srgbClr val="000000"/>
-                </a:solidFill>
-                <a:ea typeface="Pretendard SemiBold"/>
-              </a:rPr>
-              <a:t>이란 어떤 기술인가</a:t>
-            </a:r>
-            <a:r>
-              <a:rPr lang="en-US" altLang="ko-KR" sz="3733" b="0" i="0" u="none" strike="noStrike" dirty="0">
-                <a:solidFill>
-                  <a:srgbClr val="000000"/>
-                </a:solidFill>
-                <a:ea typeface="Pretendard SemiBold"/>
-              </a:rPr>
-              <a:t>?</a:t>
-            </a:r>
-            <a:endParaRPr lang="en-US" sz="3733" b="0" i="0" u="none" strike="noStrike" dirty="0">
-              <a:solidFill>
-                <a:srgbClr val="000000"/>
-              </a:solidFill>
-              <a:latin typeface="Pretendard SemiBold"/>
-            </a:endParaRPr>
-          </a:p>
-        </p:txBody>
-      </p:sp>
-      <p:pic>
-        <p:nvPicPr>
-          <p:cNvPr id="40" name="Picture 18">
-            <a:extLst>
-              <a:ext uri="{FF2B5EF4-FFF2-40B4-BE49-F238E27FC236}">
-                <a16:creationId xmlns:a16="http://schemas.microsoft.com/office/drawing/2014/main" id="{C1283B5A-975D-A37B-75FC-98893BCA9126}"/>
-              </a:ext>
-            </a:extLst>
-          </p:cNvPr>
-          <p:cNvPicPr>
-            <a:picLocks noChangeAspect="1"/>
-          </p:cNvPicPr>
-          <p:nvPr/>
-        </p:nvPicPr>
-        <p:blipFill>
-          <a:blip r:embed="rId4"/>
-          <a:stretch>
-            <a:fillRect/>
-          </a:stretch>
-        </p:blipFill>
-        <p:spPr>
-          <a:xfrm>
-            <a:off x="5012403" y="752475"/>
-            <a:ext cx="1346200" cy="1155700"/>
-          </a:xfrm>
-          <a:prstGeom prst="rect">
-            <a:avLst/>
-          </a:prstGeom>
-        </p:spPr>
-      </p:pic>
-      <p:sp>
-        <p:nvSpPr>
-          <p:cNvPr id="41" name="TextBox 19">
-            <a:extLst>
-              <a:ext uri="{FF2B5EF4-FFF2-40B4-BE49-F238E27FC236}">
-                <a16:creationId xmlns:a16="http://schemas.microsoft.com/office/drawing/2014/main" id="{C63507F6-41CD-EA03-1DB1-E8ED478CD1CF}"/>
-              </a:ext>
-            </a:extLst>
-          </p:cNvPr>
-          <p:cNvSpPr txBox="1"/>
-          <p:nvPr/>
-        </p:nvSpPr>
-        <p:spPr>
-          <a:xfrm>
-            <a:off x="7171403" y="2924175"/>
-            <a:ext cx="11493500" cy="660400"/>
-          </a:xfrm>
-          <a:prstGeom prst="rect">
-            <a:avLst/>
-          </a:prstGeom>
-        </p:spPr>
-        <p:txBody>
-          <a:bodyPr lIns="0" tIns="47413" rIns="0" bIns="47413" rtlCol="0" anchor="ctr"/>
-          <a:lstStyle/>
-          <a:p>
-            <a:pPr lvl="0" algn="l">
-              <a:lnSpc>
-                <a:spcPct val="99600"/>
-              </a:lnSpc>
-            </a:pPr>
-            <a:r>
-              <a:rPr lang="ko-KR" altLang="en-US" sz="3733" b="0" i="0" u="none" strike="noStrike" dirty="0">
-                <a:solidFill>
-                  <a:srgbClr val="000000"/>
-                </a:solidFill>
-                <a:ea typeface="Pretendard SemiBold"/>
-              </a:rPr>
-              <a:t>여러가지 데이터로 </a:t>
-            </a:r>
-            <a:r>
-              <a:rPr lang="en-US" altLang="ko-KR" sz="3733" b="0" i="0" u="none" strike="noStrike" dirty="0">
-                <a:solidFill>
-                  <a:srgbClr val="000000"/>
-                </a:solidFill>
-                <a:latin typeface="Pretendard Bold" panose="020B0600000101010101" charset="-127"/>
-                <a:ea typeface="Pretendard Bold" panose="020B0600000101010101" charset="-127"/>
-              </a:rPr>
-              <a:t>OCR</a:t>
-            </a:r>
-            <a:r>
-              <a:rPr lang="en-US" altLang="ko-KR" sz="3733" b="0" i="0" u="none" strike="noStrike" dirty="0">
-                <a:solidFill>
-                  <a:srgbClr val="000000"/>
-                </a:solidFill>
-                <a:ea typeface="Pretendard SemiBold"/>
-              </a:rPr>
-              <a:t> </a:t>
-            </a:r>
-            <a:r>
-              <a:rPr lang="ko-KR" altLang="en-US" sz="3733" b="0" i="0" u="none" strike="noStrike" dirty="0">
-                <a:solidFill>
-                  <a:srgbClr val="000000"/>
-                </a:solidFill>
-                <a:ea typeface="Pretendard SemiBold"/>
-              </a:rPr>
-              <a:t>해보기</a:t>
-            </a:r>
-            <a:endParaRPr lang="en-US" sz="3733" b="0" i="0" u="none" strike="noStrike" dirty="0">
-              <a:solidFill>
-                <a:srgbClr val="000000"/>
-              </a:solidFill>
-              <a:latin typeface="Pretendard SemiBold"/>
-            </a:endParaRPr>
-          </a:p>
-        </p:txBody>
-      </p:sp>
-      <p:pic>
-        <p:nvPicPr>
-          <p:cNvPr id="42" name="Picture 20">
-            <a:extLst>
-              <a:ext uri="{FF2B5EF4-FFF2-40B4-BE49-F238E27FC236}">
-                <a16:creationId xmlns:a16="http://schemas.microsoft.com/office/drawing/2014/main" id="{F8FEB3CC-C8D9-63A3-F6B9-30D1B60566F8}"/>
-              </a:ext>
-            </a:extLst>
-          </p:cNvPr>
-          <p:cNvPicPr>
-            <a:picLocks noChangeAspect="1"/>
-          </p:cNvPicPr>
-          <p:nvPr/>
-        </p:nvPicPr>
-        <p:blipFill>
-          <a:blip r:embed="rId5"/>
-          <a:stretch>
-            <a:fillRect/>
-          </a:stretch>
-        </p:blipFill>
-        <p:spPr>
-          <a:xfrm>
-            <a:off x="5012403" y="2670175"/>
-            <a:ext cx="1346200" cy="1155700"/>
-          </a:xfrm>
-          <a:prstGeom prst="rect">
-            <a:avLst/>
-          </a:prstGeom>
-        </p:spPr>
-      </p:pic>
-      <p:sp>
-        <p:nvSpPr>
-          <p:cNvPr id="43" name="TextBox 21">
-            <a:extLst>
-              <a:ext uri="{FF2B5EF4-FFF2-40B4-BE49-F238E27FC236}">
-                <a16:creationId xmlns:a16="http://schemas.microsoft.com/office/drawing/2014/main" id="{7DE03A64-2640-AFD0-465C-A08D1678BA56}"/>
-              </a:ext>
-            </a:extLst>
-          </p:cNvPr>
-          <p:cNvSpPr txBox="1"/>
-          <p:nvPr/>
-        </p:nvSpPr>
-        <p:spPr>
-          <a:xfrm>
-            <a:off x="7171403" y="4841875"/>
-            <a:ext cx="11493500" cy="660400"/>
-          </a:xfrm>
-          <a:prstGeom prst="rect">
-            <a:avLst/>
-          </a:prstGeom>
-        </p:spPr>
-        <p:txBody>
-          <a:bodyPr lIns="0" tIns="47413" rIns="0" bIns="47413" rtlCol="0" anchor="ctr"/>
-          <a:lstStyle/>
-          <a:p>
-            <a:pPr lvl="0" algn="l">
-              <a:lnSpc>
-                <a:spcPct val="99600"/>
-              </a:lnSpc>
-            </a:pPr>
-            <a:r>
-              <a:rPr lang="en-US" altLang="ko-KR" sz="3733" b="0" i="0" u="none" strike="noStrike" dirty="0">
-                <a:solidFill>
-                  <a:srgbClr val="000000"/>
-                </a:solidFill>
-                <a:latin typeface="Pretendard Bold" panose="020B0600000101010101" charset="-127"/>
-                <a:ea typeface="Pretendard Bold" panose="020B0600000101010101" charset="-127"/>
-              </a:rPr>
-              <a:t>OCR</a:t>
-            </a:r>
-            <a:r>
-              <a:rPr lang="en-US" altLang="ko-KR" sz="3733" b="0" i="0" u="none" strike="noStrike" dirty="0">
-                <a:solidFill>
-                  <a:srgbClr val="000000"/>
-                </a:solidFill>
-                <a:ea typeface="Pretendard SemiBold"/>
-              </a:rPr>
-              <a:t> </a:t>
-            </a:r>
-            <a:r>
-              <a:rPr lang="ko-KR" altLang="en-US" sz="3733" b="0" i="0" u="none" strike="noStrike" dirty="0">
-                <a:solidFill>
-                  <a:srgbClr val="000000"/>
-                </a:solidFill>
-                <a:ea typeface="Pretendard SemiBold"/>
-              </a:rPr>
-              <a:t>응용 기술들</a:t>
-            </a:r>
-            <a:endParaRPr lang="en-US" sz="3733" b="0" i="0" u="none" strike="noStrike" dirty="0">
-              <a:solidFill>
-                <a:srgbClr val="000000"/>
-              </a:solidFill>
-              <a:latin typeface="Pretendard SemiBold"/>
-            </a:endParaRPr>
-          </a:p>
-        </p:txBody>
-      </p:sp>
-      <p:pic>
-        <p:nvPicPr>
-          <p:cNvPr id="44" name="Picture 22">
-            <a:extLst>
-              <a:ext uri="{FF2B5EF4-FFF2-40B4-BE49-F238E27FC236}">
-                <a16:creationId xmlns:a16="http://schemas.microsoft.com/office/drawing/2014/main" id="{04DB430C-F468-83C7-5FDF-B956D0254875}"/>
-              </a:ext>
-            </a:extLst>
-          </p:cNvPr>
-          <p:cNvPicPr>
-            <a:picLocks noChangeAspect="1"/>
-          </p:cNvPicPr>
-          <p:nvPr/>
-        </p:nvPicPr>
-        <p:blipFill>
-          <a:blip r:embed="rId6"/>
-          <a:stretch>
-            <a:fillRect/>
-          </a:stretch>
-        </p:blipFill>
-        <p:spPr>
-          <a:xfrm>
-            <a:off x="5012403" y="4600575"/>
-            <a:ext cx="1346200" cy="1155700"/>
-          </a:xfrm>
-          <a:prstGeom prst="rect">
-            <a:avLst/>
-          </a:prstGeom>
-        </p:spPr>
-      </p:pic>
       <p:grpSp>
         <p:nvGrpSpPr>
           <p:cNvPr id="45" name="그룹 44">
@@ -4926,18 +4474,12 @@
         </p:nvGrpSpPr>
         <p:grpSpPr>
           <a:xfrm>
-            <a:off x="5050503" y="-1323975"/>
-            <a:ext cx="14732000" cy="1460500"/>
+            <a:off x="3939847" y="1553561"/>
+            <a:ext cx="7556829" cy="824071"/>
             <a:chOff x="7581900" y="2971800"/>
-            <a:chExt cx="14732000" cy="1460500"/>
+            <a:chExt cx="13392960" cy="1460500"/>
           </a:xfrm>
-          <a:effectLst>
-            <a:outerShdw blurRad="50800" dist="152400" dir="5400000" algn="t" rotWithShape="0">
-              <a:prstClr val="black">
-                <a:alpha val="15000"/>
-              </a:prstClr>
-            </a:outerShdw>
-          </a:effectLst>
+          <a:effectLst/>
         </p:grpSpPr>
         <p:sp>
           <p:nvSpPr>
@@ -4953,8 +4495,8 @@
           </p:nvSpPr>
           <p:spPr>
             <a:xfrm>
-              <a:off x="9372600" y="2971800"/>
-              <a:ext cx="12941300" cy="1460500"/>
+              <a:off x="9372601" y="2971800"/>
+              <a:ext cx="11602259" cy="1460500"/>
             </a:xfrm>
             <a:prstGeom prst="rect">
               <a:avLst/>
@@ -4962,7 +4504,7 @@
             <a:solidFill>
               <a:srgbClr val="EEEEEE"/>
             </a:solidFill>
-            <a:ln w="76200">
+            <a:ln w="50800">
               <a:solidFill>
                 <a:schemeClr val="tx1"/>
               </a:solidFill>
@@ -4988,9 +4530,9 @@
             <a:bodyPr rtlCol="0" anchor="ctr"/>
             <a:lstStyle/>
             <a:p>
-              <a:pPr marL="540000"/>
+              <a:pPr marL="288000"/>
               <a:r>
-                <a:rPr lang="ko-KR" altLang="en-US" sz="3730" dirty="0">
+                <a:rPr lang="ko-KR" altLang="en-US" sz="2800" dirty="0">
                   <a:solidFill>
                     <a:schemeClr val="tx1"/>
                   </a:solidFill>
@@ -5025,7 +4567,7 @@
             <a:solidFill>
               <a:srgbClr val="007BC8"/>
             </a:solidFill>
-            <a:ln w="76200">
+            <a:ln w="50800">
               <a:solidFill>
                 <a:schemeClr val="tx1"/>
               </a:solidFill>
@@ -5053,7 +4595,7 @@
             <a:p>
               <a:pPr algn="ctr"/>
               <a:r>
-                <a:rPr lang="en-US" altLang="ko-KR" sz="4650" dirty="0">
+                <a:rPr lang="en-US" altLang="ko-KR" sz="3600" dirty="0">
                   <a:ln w="25400">
                     <a:solidFill>
                       <a:schemeClr val="tx1"/>
@@ -5064,7 +4606,7 @@
                 </a:rPr>
                 <a:t>01</a:t>
               </a:r>
-              <a:endParaRPr lang="ko-KR" altLang="en-US" sz="4650" dirty="0">
+              <a:endParaRPr lang="ko-KR" altLang="en-US" sz="3600" dirty="0">
                 <a:ln w="25400">
                   <a:solidFill>
                     <a:schemeClr val="tx1"/>
@@ -5079,10 +4621,10 @@
       </p:grpSp>
       <p:grpSp>
         <p:nvGrpSpPr>
-          <p:cNvPr id="48" name="그룹 47">
-            <a:extLst>
-              <a:ext uri="{FF2B5EF4-FFF2-40B4-BE49-F238E27FC236}">
-                <a16:creationId xmlns:a16="http://schemas.microsoft.com/office/drawing/2014/main" id="{24CE5E0A-9DCD-357B-59D2-8640BCFEDB11}"/>
+          <p:cNvPr id="3" name="그룹 2">
+            <a:extLst>
+              <a:ext uri="{FF2B5EF4-FFF2-40B4-BE49-F238E27FC236}">
+                <a16:creationId xmlns:a16="http://schemas.microsoft.com/office/drawing/2014/main" id="{C6419C6E-DC8D-6A2B-4C23-2C96DCD9D7DC}"/>
               </a:ext>
             </a:extLst>
           </p:cNvPr>
@@ -5091,25 +4633,19 @@
         </p:nvGrpSpPr>
         <p:grpSpPr>
           <a:xfrm>
-            <a:off x="5050503" y="583565"/>
-            <a:ext cx="14732000" cy="1460500"/>
+            <a:off x="3939847" y="2780477"/>
+            <a:ext cx="7556828" cy="824071"/>
             <a:chOff x="7581900" y="2971800"/>
-            <a:chExt cx="14732000" cy="1460500"/>
+            <a:chExt cx="13392956" cy="1460500"/>
           </a:xfrm>
-          <a:effectLst>
-            <a:outerShdw blurRad="50800" dist="152400" dir="5400000" algn="t" rotWithShape="0">
-              <a:prstClr val="black">
-                <a:alpha val="15000"/>
-              </a:prstClr>
-            </a:outerShdw>
-          </a:effectLst>
+          <a:effectLst/>
         </p:grpSpPr>
         <p:sp>
           <p:nvSpPr>
-            <p:cNvPr id="49" name="직사각형 48">
+            <p:cNvPr id="4" name="직사각형 3">
               <a:extLst>
                 <a:ext uri="{FF2B5EF4-FFF2-40B4-BE49-F238E27FC236}">
-                  <a16:creationId xmlns:a16="http://schemas.microsoft.com/office/drawing/2014/main" id="{BC0084B6-C6BC-D5CE-379C-64F12F847356}"/>
+                  <a16:creationId xmlns:a16="http://schemas.microsoft.com/office/drawing/2014/main" id="{DD5F5DF5-82EB-EA3E-6579-11323B469A8D}"/>
                 </a:ext>
               </a:extLst>
             </p:cNvPr>
@@ -5118,8 +4654,8 @@
           </p:nvSpPr>
           <p:spPr>
             <a:xfrm>
-              <a:off x="9372600" y="2971800"/>
-              <a:ext cx="12941300" cy="1460500"/>
+              <a:off x="9372602" y="2971800"/>
+              <a:ext cx="11602254" cy="1460500"/>
             </a:xfrm>
             <a:prstGeom prst="rect">
               <a:avLst/>
@@ -5127,7 +4663,7 @@
             <a:solidFill>
               <a:srgbClr val="EEEEEE"/>
             </a:solidFill>
-            <a:ln w="76200">
+            <a:ln w="50800">
               <a:solidFill>
                 <a:schemeClr val="tx1"/>
               </a:solidFill>
@@ -5153,15 +4689,11 @@
             <a:bodyPr rtlCol="0" anchor="ctr"/>
             <a:lstStyle/>
             <a:p>
-              <a:pPr marL="540000" lvl="0">
-                <a:lnSpc>
-                  <a:spcPct val="99600"/>
-                </a:lnSpc>
-              </a:pPr>
+              <a:pPr marL="288000"/>
               <a:r>
-                <a:rPr lang="en-US" altLang="ko-KR" sz="3730" dirty="0">
+                <a:rPr lang="en-US" altLang="ko-KR" sz="2800" b="1" dirty="0">
                   <a:solidFill>
-                    <a:srgbClr val="000000"/>
+                    <a:schemeClr val="tx1"/>
                   </a:solidFill>
                   <a:latin typeface="Pretendard Bold" panose="020B0600000101010101" charset="-127"/>
                   <a:ea typeface="Pretendard Bold" panose="020B0600000101010101" charset="-127"/>
@@ -5169,38 +4701,41 @@
                 <a:t>OCR</a:t>
               </a:r>
               <a:r>
-                <a:rPr lang="ko-KR" altLang="en-US" sz="3730" dirty="0">
+                <a:rPr lang="ko-KR" altLang="en-US" sz="2800" dirty="0">
                   <a:solidFill>
-                    <a:srgbClr val="000000"/>
+                    <a:schemeClr val="tx1"/>
                   </a:solidFill>
-                  <a:ea typeface="Pretendard SemiBold"/>
+                  <a:latin typeface="Pretendard Bold" panose="020B0600000101010101" charset="-127"/>
+                  <a:ea typeface="Pretendard Bold" panose="020B0600000101010101" charset="-127"/>
                 </a:rPr>
                 <a:t>이란 어떤 기술인가</a:t>
               </a:r>
               <a:r>
-                <a:rPr lang="en-US" altLang="ko-KR" sz="3730" dirty="0">
+                <a:rPr lang="en-US" altLang="ko-KR" sz="2800" dirty="0">
                   <a:solidFill>
-                    <a:srgbClr val="000000"/>
+                    <a:schemeClr val="tx1"/>
                   </a:solidFill>
-                  <a:ea typeface="Pretendard SemiBold"/>
+                  <a:latin typeface="Pretendard Bold" panose="020B0600000101010101" charset="-127"/>
+                  <a:ea typeface="Pretendard Bold" panose="020B0600000101010101" charset="-127"/>
                 </a:rPr>
                 <a:t>?</a:t>
               </a:r>
-              <a:endParaRPr lang="en-US" altLang="ko-KR" sz="3730" dirty="0">
+              <a:endParaRPr lang="ko-KR" altLang="en-US" sz="2800" dirty="0">
                 <a:solidFill>
-                  <a:srgbClr val="000000"/>
+                  <a:schemeClr val="tx1"/>
                 </a:solidFill>
-                <a:latin typeface="Pretendard SemiBold"/>
+                <a:latin typeface="Pretendard Bold" panose="020B0600000101010101" charset="-127"/>
+                <a:ea typeface="Pretendard Bold" panose="020B0600000101010101" charset="-127"/>
               </a:endParaRPr>
             </a:p>
           </p:txBody>
         </p:sp>
         <p:sp>
           <p:nvSpPr>
-            <p:cNvPr id="50" name="직사각형 49">
+            <p:cNvPr id="5" name="직사각형 4">
               <a:extLst>
                 <a:ext uri="{FF2B5EF4-FFF2-40B4-BE49-F238E27FC236}">
-                  <a16:creationId xmlns:a16="http://schemas.microsoft.com/office/drawing/2014/main" id="{B79E40EE-7074-F27D-324F-9F64D622B5C3}"/>
+                  <a16:creationId xmlns:a16="http://schemas.microsoft.com/office/drawing/2014/main" id="{239E92B5-6C0C-8617-1409-EF1C39DAEC66}"/>
                 </a:ext>
               </a:extLst>
             </p:cNvPr>
@@ -5218,7 +4753,7 @@
             <a:solidFill>
               <a:srgbClr val="007BC8"/>
             </a:solidFill>
-            <a:ln w="76200">
+            <a:ln w="50800">
               <a:solidFill>
                 <a:schemeClr val="tx1"/>
               </a:solidFill>
@@ -5246,7 +4781,7 @@
             <a:p>
               <a:pPr algn="ctr"/>
               <a:r>
-                <a:rPr lang="en-US" altLang="ko-KR" sz="4650" dirty="0">
+                <a:rPr lang="en-US" altLang="ko-KR" sz="3600" dirty="0">
                   <a:ln w="25400">
                     <a:solidFill>
                       <a:schemeClr val="tx1"/>
@@ -5257,7 +4792,7 @@
                 </a:rPr>
                 <a:t>02</a:t>
               </a:r>
-              <a:endParaRPr lang="ko-KR" altLang="en-US" sz="4650" dirty="0">
+              <a:endParaRPr lang="ko-KR" altLang="en-US" sz="3600" dirty="0">
                 <a:ln w="25400">
                   <a:solidFill>
                     <a:schemeClr val="tx1"/>
@@ -5272,10 +4807,10 @@
       </p:grpSp>
       <p:grpSp>
         <p:nvGrpSpPr>
-          <p:cNvPr id="51" name="그룹 50">
-            <a:extLst>
-              <a:ext uri="{FF2B5EF4-FFF2-40B4-BE49-F238E27FC236}">
-                <a16:creationId xmlns:a16="http://schemas.microsoft.com/office/drawing/2014/main" id="{42B4B490-4CB5-50A8-71AF-93F6AA66A916}"/>
+          <p:cNvPr id="6" name="그룹 5">
+            <a:extLst>
+              <a:ext uri="{FF2B5EF4-FFF2-40B4-BE49-F238E27FC236}">
+                <a16:creationId xmlns:a16="http://schemas.microsoft.com/office/drawing/2014/main" id="{A468D86B-2DE2-EE4A-DA59-3938C0B72325}"/>
               </a:ext>
             </a:extLst>
           </p:cNvPr>
@@ -5284,25 +4819,19 @@
         </p:nvGrpSpPr>
         <p:grpSpPr>
           <a:xfrm>
-            <a:off x="5050503" y="2536825"/>
-            <a:ext cx="14732000" cy="1460500"/>
+            <a:off x="3939847" y="3973941"/>
+            <a:ext cx="7556826" cy="824071"/>
             <a:chOff x="7581900" y="2971800"/>
-            <a:chExt cx="14732000" cy="1460500"/>
+            <a:chExt cx="13392952" cy="1460500"/>
           </a:xfrm>
-          <a:effectLst>
-            <a:outerShdw blurRad="50800" dist="152400" dir="5400000" algn="t" rotWithShape="0">
-              <a:prstClr val="black">
-                <a:alpha val="15000"/>
-              </a:prstClr>
-            </a:outerShdw>
-          </a:effectLst>
+          <a:effectLst/>
         </p:grpSpPr>
         <p:sp>
           <p:nvSpPr>
-            <p:cNvPr id="52" name="직사각형 51">
+            <p:cNvPr id="7" name="직사각형 6">
               <a:extLst>
                 <a:ext uri="{FF2B5EF4-FFF2-40B4-BE49-F238E27FC236}">
-                  <a16:creationId xmlns:a16="http://schemas.microsoft.com/office/drawing/2014/main" id="{2C395DDF-F6DB-351E-7632-845F1FB2A4A6}"/>
+                  <a16:creationId xmlns:a16="http://schemas.microsoft.com/office/drawing/2014/main" id="{7E39ADD4-774B-DF55-59CB-3A4F47AB7BA6}"/>
                 </a:ext>
               </a:extLst>
             </p:cNvPr>
@@ -5312,7 +4841,7 @@
           <p:spPr>
             <a:xfrm>
               <a:off x="9372600" y="2971800"/>
-              <a:ext cx="12941300" cy="1460500"/>
+              <a:ext cx="11602252" cy="1460500"/>
             </a:xfrm>
             <a:prstGeom prst="rect">
               <a:avLst/>
@@ -5320,7 +4849,7 @@
             <a:solidFill>
               <a:srgbClr val="EEEEEE"/>
             </a:solidFill>
-            <a:ln w="76200">
+            <a:ln w="50800">
               <a:solidFill>
                 <a:schemeClr val="tx1"/>
               </a:solidFill>
@@ -5346,24 +4875,21 @@
             <a:bodyPr rtlCol="0" anchor="ctr"/>
             <a:lstStyle/>
             <a:p>
-              <a:pPr marL="540000" lvl="0">
-                <a:lnSpc>
-                  <a:spcPct val="99600"/>
-                </a:lnSpc>
-              </a:pPr>
+              <a:pPr marL="288000"/>
               <a:r>
-                <a:rPr lang="ko-KR" altLang="en-US" sz="3730" dirty="0">
+                <a:rPr lang="ko-KR" altLang="en-US" sz="2800" dirty="0">
                   <a:solidFill>
-                    <a:srgbClr val="000000"/>
+                    <a:schemeClr val="tx1"/>
                   </a:solidFill>
-                  <a:ea typeface="Pretendard SemiBold"/>
+                  <a:latin typeface="Pretendard Bold" panose="020B0600000101010101" charset="-127"/>
+                  <a:ea typeface="Pretendard Bold" panose="020B0600000101010101" charset="-127"/>
                 </a:rPr>
                 <a:t>여러가지 데이터로 </a:t>
               </a:r>
               <a:r>
-                <a:rPr lang="en-US" altLang="ko-KR" sz="3730" dirty="0">
+                <a:rPr lang="en-US" altLang="ko-KR" sz="2800" b="1" dirty="0">
                   <a:solidFill>
-                    <a:srgbClr val="000000"/>
+                    <a:schemeClr val="tx1"/>
                   </a:solidFill>
                   <a:latin typeface="Pretendard Bold" panose="020B0600000101010101" charset="-127"/>
                   <a:ea typeface="Pretendard Bold" panose="020B0600000101010101" charset="-127"/>
@@ -5371,38 +4897,34 @@
                 <a:t>OCR</a:t>
               </a:r>
               <a:r>
-                <a:rPr lang="en-US" altLang="ko-KR" sz="3730" dirty="0">
+                <a:rPr lang="en-US" altLang="ko-KR" sz="2800" dirty="0">
                   <a:solidFill>
-                    <a:srgbClr val="000000"/>
+                    <a:schemeClr val="tx1"/>
                   </a:solidFill>
-                  <a:ea typeface="Pretendard SemiBold"/>
+                  <a:latin typeface="Pretendard Bold" panose="020B0600000101010101" charset="-127"/>
+                  <a:ea typeface="Pretendard Bold" panose="020B0600000101010101" charset="-127"/>
                 </a:rPr>
                 <a:t> </a:t>
               </a:r>
               <a:r>
-                <a:rPr lang="ko-KR" altLang="en-US" sz="3730" dirty="0">
+                <a:rPr lang="ko-KR" altLang="en-US" sz="2800" dirty="0">
                   <a:solidFill>
-                    <a:srgbClr val="000000"/>
+                    <a:schemeClr val="tx1"/>
                   </a:solidFill>
-                  <a:ea typeface="Pretendard SemiBold"/>
+                  <a:latin typeface="Pretendard Bold" panose="020B0600000101010101" charset="-127"/>
+                  <a:ea typeface="Pretendard Bold" panose="020B0600000101010101" charset="-127"/>
                 </a:rPr>
                 <a:t>해보기</a:t>
               </a:r>
-              <a:endParaRPr lang="en-US" altLang="ko-KR" sz="3730" dirty="0">
-                <a:solidFill>
-                  <a:srgbClr val="000000"/>
-                </a:solidFill>
-                <a:latin typeface="Pretendard SemiBold"/>
-              </a:endParaRPr>
             </a:p>
           </p:txBody>
         </p:sp>
         <p:sp>
           <p:nvSpPr>
-            <p:cNvPr id="53" name="직사각형 52">
+            <p:cNvPr id="8" name="직사각형 7">
               <a:extLst>
                 <a:ext uri="{FF2B5EF4-FFF2-40B4-BE49-F238E27FC236}">
-                  <a16:creationId xmlns:a16="http://schemas.microsoft.com/office/drawing/2014/main" id="{B6D3F783-0552-0236-CC2B-582FC85639B5}"/>
+                  <a16:creationId xmlns:a16="http://schemas.microsoft.com/office/drawing/2014/main" id="{5E42B0BA-896E-AE3E-A3A2-B65B2A53798B}"/>
                 </a:ext>
               </a:extLst>
             </p:cNvPr>
@@ -5420,7 +4942,7 @@
             <a:solidFill>
               <a:srgbClr val="007BC8"/>
             </a:solidFill>
-            <a:ln w="76200">
+            <a:ln w="50800">
               <a:solidFill>
                 <a:schemeClr val="tx1"/>
               </a:solidFill>
@@ -5448,7 +4970,7 @@
             <a:p>
               <a:pPr algn="ctr"/>
               <a:r>
-                <a:rPr lang="en-US" altLang="ko-KR" sz="4650" dirty="0">
+                <a:rPr lang="en-US" altLang="ko-KR" sz="3600" dirty="0">
                   <a:ln w="25400">
                     <a:solidFill>
                       <a:schemeClr val="tx1"/>
@@ -5459,7 +4981,7 @@
                 </a:rPr>
                 <a:t>03</a:t>
               </a:r>
-              <a:endParaRPr lang="ko-KR" altLang="en-US" sz="4650" dirty="0">
+              <a:endParaRPr lang="ko-KR" altLang="en-US" sz="3600" dirty="0">
                 <a:ln w="25400">
                   <a:solidFill>
                     <a:schemeClr val="tx1"/>
@@ -5474,10 +4996,10 @@
       </p:grpSp>
       <p:grpSp>
         <p:nvGrpSpPr>
-          <p:cNvPr id="54" name="그룹 53">
-            <a:extLst>
-              <a:ext uri="{FF2B5EF4-FFF2-40B4-BE49-F238E27FC236}">
-                <a16:creationId xmlns:a16="http://schemas.microsoft.com/office/drawing/2014/main" id="{EDB8ED0E-CE76-EB4B-CE50-7BB161EBC76F}"/>
+          <p:cNvPr id="9" name="그룹 8">
+            <a:extLst>
+              <a:ext uri="{FF2B5EF4-FFF2-40B4-BE49-F238E27FC236}">
+                <a16:creationId xmlns:a16="http://schemas.microsoft.com/office/drawing/2014/main" id="{72361F42-8CC4-BCB9-1DBF-0F2B44BC900D}"/>
               </a:ext>
             </a:extLst>
           </p:cNvPr>
@@ -5486,25 +5008,19 @@
         </p:nvGrpSpPr>
         <p:grpSpPr>
           <a:xfrm>
-            <a:off x="5050503" y="4441825"/>
-            <a:ext cx="14732000" cy="1460500"/>
+            <a:off x="3939847" y="5200857"/>
+            <a:ext cx="7556826" cy="824071"/>
             <a:chOff x="7581900" y="2971800"/>
-            <a:chExt cx="14732000" cy="1460500"/>
+            <a:chExt cx="13392953" cy="1460500"/>
           </a:xfrm>
-          <a:effectLst>
-            <a:outerShdw blurRad="50800" dist="152400" dir="5400000" algn="t" rotWithShape="0">
-              <a:prstClr val="black">
-                <a:alpha val="15000"/>
-              </a:prstClr>
-            </a:outerShdw>
-          </a:effectLst>
+          <a:effectLst/>
         </p:grpSpPr>
         <p:sp>
           <p:nvSpPr>
-            <p:cNvPr id="55" name="직사각형 54">
+            <p:cNvPr id="10" name="직사각형 9">
               <a:extLst>
                 <a:ext uri="{FF2B5EF4-FFF2-40B4-BE49-F238E27FC236}">
-                  <a16:creationId xmlns:a16="http://schemas.microsoft.com/office/drawing/2014/main" id="{CA18DE97-654A-F490-AF9E-63B176CD623F}"/>
+                  <a16:creationId xmlns:a16="http://schemas.microsoft.com/office/drawing/2014/main" id="{733978C9-1BB4-DB50-E4A3-EFEAB626AED7}"/>
                 </a:ext>
               </a:extLst>
             </p:cNvPr>
@@ -5513,8 +5029,8 @@
           </p:nvSpPr>
           <p:spPr>
             <a:xfrm>
-              <a:off x="9372600" y="2971800"/>
-              <a:ext cx="12941300" cy="1460500"/>
+              <a:off x="9372602" y="2971800"/>
+              <a:ext cx="11602251" cy="1460500"/>
             </a:xfrm>
             <a:prstGeom prst="rect">
               <a:avLst/>
@@ -5522,7 +5038,7 @@
             <a:solidFill>
               <a:srgbClr val="EEEEEE"/>
             </a:solidFill>
-            <a:ln w="76200">
+            <a:ln w="50800">
               <a:solidFill>
                 <a:schemeClr val="tx1"/>
               </a:solidFill>
@@ -5548,54 +5064,26 @@
             <a:bodyPr rtlCol="0" anchor="ctr"/>
             <a:lstStyle/>
             <a:p>
-              <a:pPr marL="540000" lvl="0">
-                <a:lnSpc>
-                  <a:spcPct val="99600"/>
-                </a:lnSpc>
-              </a:pPr>
+              <a:pPr marL="288000"/>
               <a:r>
-                <a:rPr lang="en-US" altLang="ko-KR" sz="3730" dirty="0">
+                <a:rPr lang="ko-KR" altLang="en-US" sz="2800" dirty="0">
                   <a:solidFill>
-                    <a:srgbClr val="000000"/>
+                    <a:schemeClr val="tx1"/>
                   </a:solidFill>
                   <a:latin typeface="Pretendard Bold" panose="020B0600000101010101" charset="-127"/>
                   <a:ea typeface="Pretendard Bold" panose="020B0600000101010101" charset="-127"/>
                 </a:rPr>
-                <a:t>OCR</a:t>
+                <a:t>결론 및 향후 방향성</a:t>
               </a:r>
-              <a:r>
-                <a:rPr lang="en-US" altLang="ko-KR" sz="3730" dirty="0">
-                  <a:solidFill>
-                    <a:srgbClr val="000000"/>
-                  </a:solidFill>
-                  <a:ea typeface="Pretendard SemiBold"/>
-                </a:rPr>
-                <a:t> </a:t>
-              </a:r>
-              <a:r>
-                <a:rPr lang="ko-KR" altLang="en-US" sz="3730" dirty="0">
-                  <a:solidFill>
-                    <a:srgbClr val="000000"/>
-                  </a:solidFill>
-                  <a:ea typeface="Pretendard SemiBold"/>
-                </a:rPr>
-                <a:t>응용 기술들</a:t>
-              </a:r>
-              <a:endParaRPr lang="en-US" altLang="ko-KR" sz="3730" dirty="0">
-                <a:solidFill>
-                  <a:srgbClr val="000000"/>
-                </a:solidFill>
-                <a:latin typeface="Pretendard SemiBold"/>
-              </a:endParaRPr>
             </a:p>
           </p:txBody>
         </p:sp>
         <p:sp>
           <p:nvSpPr>
-            <p:cNvPr id="56" name="직사각형 55">
+            <p:cNvPr id="11" name="직사각형 10">
               <a:extLst>
                 <a:ext uri="{FF2B5EF4-FFF2-40B4-BE49-F238E27FC236}">
-                  <a16:creationId xmlns:a16="http://schemas.microsoft.com/office/drawing/2014/main" id="{87F92292-92FD-3B96-D5AD-4C7131E04872}"/>
+                  <a16:creationId xmlns:a16="http://schemas.microsoft.com/office/drawing/2014/main" id="{A20A0375-B8EE-634E-74BE-E9FC04692362}"/>
                 </a:ext>
               </a:extLst>
             </p:cNvPr>
@@ -5613,7 +5101,7 @@
             <a:solidFill>
               <a:srgbClr val="007BC8"/>
             </a:solidFill>
-            <a:ln w="76200">
+            <a:ln w="50800">
               <a:solidFill>
                 <a:schemeClr val="tx1"/>
               </a:solidFill>
@@ -5641,7 +5129,7 @@
             <a:p>
               <a:pPr algn="ctr"/>
               <a:r>
-                <a:rPr lang="en-US" altLang="ko-KR" sz="4600" dirty="0">
+                <a:rPr lang="en-US" altLang="ko-KR" sz="3600" dirty="0">
                   <a:ln w="25400">
                     <a:solidFill>
                       <a:schemeClr val="tx1"/>
@@ -5652,181 +5140,7 @@
                 </a:rPr>
                 <a:t>04</a:t>
               </a:r>
-              <a:endParaRPr lang="ko-KR" altLang="en-US" sz="4600" dirty="0">
-                <a:ln w="25400">
-                  <a:solidFill>
-                    <a:schemeClr val="tx1"/>
-                  </a:solidFill>
-                </a:ln>
-                <a:latin typeface="CookieRun Bold" panose="020B0600000101010101" pitchFamily="50" charset="-127"/>
-                <a:ea typeface="CookieRun Bold" panose="020B0600000101010101" pitchFamily="50" charset="-127"/>
-              </a:endParaRPr>
-            </a:p>
-          </p:txBody>
-        </p:sp>
-      </p:grpSp>
-      <p:grpSp>
-        <p:nvGrpSpPr>
-          <p:cNvPr id="57" name="그룹 56">
-            <a:extLst>
-              <a:ext uri="{FF2B5EF4-FFF2-40B4-BE49-F238E27FC236}">
-                <a16:creationId xmlns:a16="http://schemas.microsoft.com/office/drawing/2014/main" id="{63697E20-1B89-7F17-F1A6-D0959C1498A8}"/>
-              </a:ext>
-            </a:extLst>
-          </p:cNvPr>
-          <p:cNvGrpSpPr/>
-          <p:nvPr/>
-        </p:nvGrpSpPr>
-        <p:grpSpPr>
-          <a:xfrm>
-            <a:off x="5050503" y="6344444"/>
-            <a:ext cx="14732000" cy="1460500"/>
-            <a:chOff x="7581900" y="2971800"/>
-            <a:chExt cx="14732000" cy="1460500"/>
-          </a:xfrm>
-          <a:effectLst>
-            <a:outerShdw blurRad="50800" dist="152400" dir="5400000" algn="t" rotWithShape="0">
-              <a:prstClr val="black">
-                <a:alpha val="15000"/>
-              </a:prstClr>
-            </a:outerShdw>
-          </a:effectLst>
-        </p:grpSpPr>
-        <p:sp>
-          <p:nvSpPr>
-            <p:cNvPr id="58" name="직사각형 57">
-              <a:extLst>
-                <a:ext uri="{FF2B5EF4-FFF2-40B4-BE49-F238E27FC236}">
-                  <a16:creationId xmlns:a16="http://schemas.microsoft.com/office/drawing/2014/main" id="{7001FE9F-BBC5-7C77-A8FA-8A795C61D62F}"/>
-                </a:ext>
-              </a:extLst>
-            </p:cNvPr>
-            <p:cNvSpPr/>
-            <p:nvPr/>
-          </p:nvSpPr>
-          <p:spPr>
-            <a:xfrm>
-              <a:off x="9372600" y="2971800"/>
-              <a:ext cx="12941300" cy="1460500"/>
-            </a:xfrm>
-            <a:prstGeom prst="rect">
-              <a:avLst/>
-            </a:prstGeom>
-            <a:solidFill>
-              <a:srgbClr val="EEEEEE"/>
-            </a:solidFill>
-            <a:ln w="76200">
-              <a:solidFill>
-                <a:schemeClr val="tx1"/>
-              </a:solidFill>
-            </a:ln>
-          </p:spPr>
-          <p:style>
-            <a:lnRef idx="2">
-              <a:schemeClr val="accent1">
-                <a:shade val="15000"/>
-              </a:schemeClr>
-            </a:lnRef>
-            <a:fillRef idx="1">
-              <a:schemeClr val="accent1"/>
-            </a:fillRef>
-            <a:effectRef idx="0">
-              <a:schemeClr val="accent1"/>
-            </a:effectRef>
-            <a:fontRef idx="minor">
-              <a:schemeClr val="lt1"/>
-            </a:fontRef>
-          </p:style>
-          <p:txBody>
-            <a:bodyPr rtlCol="0" anchor="ctr"/>
-            <a:lstStyle/>
-            <a:p>
-              <a:pPr marL="540000" lvl="0">
-                <a:lnSpc>
-                  <a:spcPct val="99600"/>
-                </a:lnSpc>
-              </a:pPr>
-              <a:r>
-                <a:rPr lang="ko-KR" altLang="en-US" sz="3730" dirty="0">
-                  <a:solidFill>
-                    <a:srgbClr val="000000"/>
-                  </a:solidFill>
-                  <a:ea typeface="Pretendard SemiBold"/>
-                </a:rPr>
-                <a:t>결론 및 향후 방향성 </a:t>
-              </a:r>
-              <a:endParaRPr lang="en-US" altLang="ko-KR" sz="3730" dirty="0">
-                <a:solidFill>
-                  <a:srgbClr val="000000"/>
-                </a:solidFill>
-                <a:latin typeface="Pretendard SemiBold"/>
-              </a:endParaRPr>
-            </a:p>
-          </p:txBody>
-        </p:sp>
-        <p:sp>
-          <p:nvSpPr>
-            <p:cNvPr id="59" name="직사각형 58">
-              <a:extLst>
-                <a:ext uri="{FF2B5EF4-FFF2-40B4-BE49-F238E27FC236}">
-                  <a16:creationId xmlns:a16="http://schemas.microsoft.com/office/drawing/2014/main" id="{2B32CB35-E43C-7873-2FF5-F5698645AA32}"/>
-                </a:ext>
-              </a:extLst>
-            </p:cNvPr>
-            <p:cNvSpPr/>
-            <p:nvPr/>
-          </p:nvSpPr>
-          <p:spPr>
-            <a:xfrm>
-              <a:off x="7581900" y="2971800"/>
-              <a:ext cx="1790700" cy="1460500"/>
-            </a:xfrm>
-            <a:prstGeom prst="rect">
-              <a:avLst/>
-            </a:prstGeom>
-            <a:solidFill>
-              <a:srgbClr val="007BC8"/>
-            </a:solidFill>
-            <a:ln w="76200">
-              <a:solidFill>
-                <a:schemeClr val="tx1"/>
-              </a:solidFill>
-            </a:ln>
-          </p:spPr>
-          <p:style>
-            <a:lnRef idx="2">
-              <a:schemeClr val="accent1">
-                <a:shade val="15000"/>
-              </a:schemeClr>
-            </a:lnRef>
-            <a:fillRef idx="1">
-              <a:schemeClr val="accent1"/>
-            </a:fillRef>
-            <a:effectRef idx="0">
-              <a:schemeClr val="accent1"/>
-            </a:effectRef>
-            <a:fontRef idx="minor">
-              <a:schemeClr val="lt1"/>
-            </a:fontRef>
-          </p:style>
-          <p:txBody>
-            <a:bodyPr rtlCol="0" anchor="ctr"/>
-            <a:lstStyle/>
-            <a:p>
-              <a:pPr algn="ctr"/>
-              <a:r>
-                <a:rPr lang="en-US" altLang="ko-KR" sz="4650" dirty="0">
-                  <a:ln w="25400">
-                    <a:solidFill>
-                      <a:schemeClr val="tx1"/>
-                    </a:solidFill>
-                  </a:ln>
-                  <a:latin typeface="CookieRun Bold" panose="020B0600000101010101" pitchFamily="50" charset="-127"/>
-                  <a:ea typeface="CookieRun Bold" panose="020B0600000101010101" pitchFamily="50" charset="-127"/>
-                </a:rPr>
-                <a:t>05</a:t>
-              </a:r>
-              <a:endParaRPr lang="ko-KR" altLang="en-US" sz="4650" dirty="0">
+              <a:endParaRPr lang="ko-KR" altLang="en-US" sz="3600" dirty="0">
                 <a:ln w="25400">
                   <a:solidFill>
                     <a:schemeClr val="tx1"/>
@@ -5899,6 +5213,224 @@
           </a:p>
         </p:txBody>
       </p:sp>
+      <p:pic>
+        <p:nvPicPr>
+          <p:cNvPr id="3" name="그림 2">
+            <a:extLst>
+              <a:ext uri="{FF2B5EF4-FFF2-40B4-BE49-F238E27FC236}">
+                <a16:creationId xmlns:a16="http://schemas.microsoft.com/office/drawing/2014/main" id="{361340A3-B6C8-3CF5-1170-42221D5DF31D}"/>
+              </a:ext>
+            </a:extLst>
+          </p:cNvPr>
+          <p:cNvPicPr>
+            <a:picLocks noChangeAspect="1"/>
+          </p:cNvPicPr>
+          <p:nvPr/>
+        </p:nvPicPr>
+        <p:blipFill>
+          <a:blip r:embed="rId2"/>
+          <a:stretch>
+            <a:fillRect/>
+          </a:stretch>
+        </p:blipFill>
+        <p:spPr>
+          <a:xfrm>
+            <a:off x="15240" y="0"/>
+            <a:ext cx="12192000" cy="6858000"/>
+          </a:xfrm>
+          <a:prstGeom prst="rect">
+            <a:avLst/>
+          </a:prstGeom>
+          <a:noFill/>
+        </p:spPr>
+      </p:pic>
+      <p:sp>
+        <p:nvSpPr>
+          <p:cNvPr id="4" name="직사각형 3">
+            <a:extLst>
+              <a:ext uri="{FF2B5EF4-FFF2-40B4-BE49-F238E27FC236}">
+                <a16:creationId xmlns:a16="http://schemas.microsoft.com/office/drawing/2014/main" id="{C238BF38-BF47-B96C-AD3A-E8138F115312}"/>
+              </a:ext>
+            </a:extLst>
+          </p:cNvPr>
+          <p:cNvSpPr/>
+          <p:nvPr/>
+        </p:nvSpPr>
+        <p:spPr>
+          <a:xfrm>
+            <a:off x="0" y="0"/>
+            <a:ext cx="12292314" cy="6858000"/>
+          </a:xfrm>
+          <a:prstGeom prst="rect">
+            <a:avLst/>
+          </a:prstGeom>
+          <a:gradFill flip="none" rotWithShape="1">
+            <a:gsLst>
+              <a:gs pos="66000">
+                <a:srgbClr val="2C92D2">
+                  <a:alpha val="90000"/>
+                </a:srgbClr>
+              </a:gs>
+              <a:gs pos="33000">
+                <a:srgbClr val="58A8DB">
+                  <a:alpha val="80000"/>
+                </a:srgbClr>
+              </a:gs>
+              <a:gs pos="0">
+                <a:schemeClr val="accent1">
+                  <a:lumMod val="5000"/>
+                  <a:lumOff val="95000"/>
+                  <a:alpha val="60000"/>
+                </a:schemeClr>
+              </a:gs>
+              <a:gs pos="100000">
+                <a:srgbClr val="007BC8"/>
+              </a:gs>
+            </a:gsLst>
+            <a:lin ang="10800000" scaled="0"/>
+            <a:tileRect/>
+          </a:gradFill>
+          <a:ln>
+            <a:noFill/>
+          </a:ln>
+        </p:spPr>
+        <p:style>
+          <a:lnRef idx="2">
+            <a:schemeClr val="accent1">
+              <a:shade val="15000"/>
+            </a:schemeClr>
+          </a:lnRef>
+          <a:fillRef idx="1">
+            <a:schemeClr val="accent1"/>
+          </a:fillRef>
+          <a:effectRef idx="0">
+            <a:schemeClr val="accent1"/>
+          </a:effectRef>
+          <a:fontRef idx="minor">
+            <a:schemeClr val="lt1"/>
+          </a:fontRef>
+        </p:style>
+        <p:txBody>
+          <a:bodyPr rtlCol="0" anchor="ctr"/>
+          <a:lstStyle/>
+          <a:p>
+            <a:pPr algn="ctr"/>
+            <a:endParaRPr lang="ko-KR" altLang="en-US"/>
+          </a:p>
+        </p:txBody>
+      </p:sp>
+      <p:sp>
+        <p:nvSpPr>
+          <p:cNvPr id="5" name="TextBox 9">
+            <a:extLst>
+              <a:ext uri="{FF2B5EF4-FFF2-40B4-BE49-F238E27FC236}">
+                <a16:creationId xmlns:a16="http://schemas.microsoft.com/office/drawing/2014/main" id="{4B21D984-500F-2451-8CDF-6B49C2C079E1}"/>
+              </a:ext>
+            </a:extLst>
+          </p:cNvPr>
+          <p:cNvSpPr txBox="1"/>
+          <p:nvPr/>
+        </p:nvSpPr>
+        <p:spPr>
+          <a:xfrm>
+            <a:off x="1055688" y="4226050"/>
+            <a:ext cx="5844149" cy="991870"/>
+          </a:xfrm>
+          <a:prstGeom prst="rect">
+            <a:avLst/>
+          </a:prstGeom>
+        </p:spPr>
+        <p:txBody>
+          <a:bodyPr lIns="0" tIns="135467" rIns="0" bIns="135467" rtlCol="0" anchor="ctr"/>
+          <a:lstStyle/>
+          <a:p>
+            <a:pPr lvl="0" algn="l">
+              <a:lnSpc>
+                <a:spcPct val="99600"/>
+              </a:lnSpc>
+            </a:pPr>
+            <a:r>
+              <a:rPr lang="ko-KR" altLang="en-US" sz="6000" b="0" i="0" u="none" strike="noStrike" spc="107" dirty="0">
+                <a:ln w="25400">
+                  <a:noFill/>
+                </a:ln>
+                <a:solidFill>
+                  <a:schemeClr val="bg1"/>
+                </a:solidFill>
+                <a:latin typeface="구름 산스 700" pitchFamily="2" charset="-127"/>
+                <a:ea typeface="구름 산스 700" pitchFamily="2" charset="-127"/>
+              </a:rPr>
+              <a:t>주제 선택 배경</a:t>
+            </a:r>
+            <a:endParaRPr lang="ko-KR" sz="6000" b="0" i="0" u="none" strike="noStrike" spc="107" dirty="0">
+              <a:ln w="25400">
+                <a:noFill/>
+              </a:ln>
+              <a:solidFill>
+                <a:schemeClr val="bg1"/>
+              </a:solidFill>
+              <a:latin typeface="구름 산스 700" pitchFamily="2" charset="-127"/>
+              <a:ea typeface="구름 산스 700" pitchFamily="2" charset="-127"/>
+            </a:endParaRPr>
+          </a:p>
+        </p:txBody>
+      </p:sp>
+      <p:sp>
+        <p:nvSpPr>
+          <p:cNvPr id="6" name="직사각형 5">
+            <a:extLst>
+              <a:ext uri="{FF2B5EF4-FFF2-40B4-BE49-F238E27FC236}">
+                <a16:creationId xmlns:a16="http://schemas.microsoft.com/office/drawing/2014/main" id="{383681BE-7B9C-7904-97DA-4B6A0322B23A}"/>
+              </a:ext>
+            </a:extLst>
+          </p:cNvPr>
+          <p:cNvSpPr/>
+          <p:nvPr/>
+        </p:nvSpPr>
+        <p:spPr>
+          <a:xfrm>
+            <a:off x="1055688" y="2644170"/>
+            <a:ext cx="1553630" cy="1569660"/>
+          </a:xfrm>
+          <a:prstGeom prst="rect">
+            <a:avLst/>
+          </a:prstGeom>
+          <a:noFill/>
+        </p:spPr>
+        <p:txBody>
+          <a:bodyPr wrap="none" lIns="91440" tIns="45720" rIns="91440" bIns="45720">
+            <a:spAutoFit/>
+          </a:bodyPr>
+          <a:lstStyle/>
+          <a:p>
+            <a:pPr algn="ctr"/>
+            <a:r>
+              <a:rPr lang="en-US" altLang="ko-KR" sz="9600" b="1" dirty="0">
+                <a:ln w="63500">
+                  <a:solidFill>
+                    <a:schemeClr val="bg1"/>
+                  </a:solidFill>
+                  <a:prstDash val="solid"/>
+                </a:ln>
+                <a:solidFill>
+                  <a:srgbClr val="FFFFFF"/>
+                </a:solidFill>
+                <a:effectLst>
+                  <a:outerShdw blurRad="50800" dist="88900" dir="1560000" algn="l" rotWithShape="0">
+                    <a:srgbClr val="002060">
+                      <a:alpha val="40000"/>
+                    </a:srgbClr>
+                  </a:outerShdw>
+                </a:effectLst>
+                <a:latin typeface="Pretendard ExtraBold" panose="020B0600000101010101" charset="-127"/>
+                <a:ea typeface="Pretendard ExtraBold" panose="020B0600000101010101" charset="-127"/>
+                <a:cs typeface="Malgun Gothic Semilight" panose="020B0503020000020004" pitchFamily="34" charset="-127"/>
+              </a:rPr>
+              <a:t>01</a:t>
+            </a:r>
+          </a:p>
+        </p:txBody>
+      </p:sp>
     </p:spTree>
     <p:extLst>
       <p:ext uri="{BB962C8B-B14F-4D97-AF65-F5344CB8AC3E}">
@@ -5917,7 +5449,13 @@
   <p:cSld>
     <p:spTree>
       <p:nvGrpSpPr>
-        <p:cNvPr id="1" name=""/>
+        <p:cNvPr id="1" name="">
+          <a:extLst>
+            <a:ext uri="{FF2B5EF4-FFF2-40B4-BE49-F238E27FC236}">
+              <a16:creationId xmlns:a16="http://schemas.microsoft.com/office/drawing/2014/main" id="{D4E753E3-067E-55F6-4B36-21E1376F2B2A}"/>
+            </a:ext>
+          </a:extLst>
+        </p:cNvPr>
         <p:cNvGrpSpPr/>
         <p:nvPr/>
       </p:nvGrpSpPr>
@@ -5934,7 +5472,7 @@
           <p:cNvPr id="2" name="슬라이드 번호 개체 틀 1">
             <a:extLst>
               <a:ext uri="{FF2B5EF4-FFF2-40B4-BE49-F238E27FC236}">
-                <a16:creationId xmlns:a16="http://schemas.microsoft.com/office/drawing/2014/main" id="{EBFF8EB2-C1B4-714D-9355-59645F1ED63E}"/>
+                <a16:creationId xmlns:a16="http://schemas.microsoft.com/office/drawing/2014/main" id="{579DBAFB-0D98-2FF2-DF2F-CDC709072F1A}"/>
               </a:ext>
             </a:extLst>
           </p:cNvPr>
@@ -5959,10 +5497,228 @@
           </a:p>
         </p:txBody>
       </p:sp>
+      <p:pic>
+        <p:nvPicPr>
+          <p:cNvPr id="3" name="그림 2">
+            <a:extLst>
+              <a:ext uri="{FF2B5EF4-FFF2-40B4-BE49-F238E27FC236}">
+                <a16:creationId xmlns:a16="http://schemas.microsoft.com/office/drawing/2014/main" id="{4F14FA09-5940-7A56-3495-F729C4F7A81C}"/>
+              </a:ext>
+            </a:extLst>
+          </p:cNvPr>
+          <p:cNvPicPr>
+            <a:picLocks noChangeAspect="1"/>
+          </p:cNvPicPr>
+          <p:nvPr/>
+        </p:nvPicPr>
+        <p:blipFill>
+          <a:blip r:embed="rId2"/>
+          <a:stretch>
+            <a:fillRect/>
+          </a:stretch>
+        </p:blipFill>
+        <p:spPr>
+          <a:xfrm>
+            <a:off x="15240" y="0"/>
+            <a:ext cx="12192000" cy="6858000"/>
+          </a:xfrm>
+          <a:prstGeom prst="rect">
+            <a:avLst/>
+          </a:prstGeom>
+          <a:noFill/>
+        </p:spPr>
+      </p:pic>
+      <p:sp>
+        <p:nvSpPr>
+          <p:cNvPr id="4" name="직사각형 3">
+            <a:extLst>
+              <a:ext uri="{FF2B5EF4-FFF2-40B4-BE49-F238E27FC236}">
+                <a16:creationId xmlns:a16="http://schemas.microsoft.com/office/drawing/2014/main" id="{221ACA4D-B9C6-FFBD-2164-8925677E43D7}"/>
+              </a:ext>
+            </a:extLst>
+          </p:cNvPr>
+          <p:cNvSpPr/>
+          <p:nvPr/>
+        </p:nvSpPr>
+        <p:spPr>
+          <a:xfrm>
+            <a:off x="0" y="0"/>
+            <a:ext cx="12292314" cy="6858000"/>
+          </a:xfrm>
+          <a:prstGeom prst="rect">
+            <a:avLst/>
+          </a:prstGeom>
+          <a:gradFill flip="none" rotWithShape="1">
+            <a:gsLst>
+              <a:gs pos="66000">
+                <a:srgbClr val="2C92D2">
+                  <a:alpha val="90000"/>
+                </a:srgbClr>
+              </a:gs>
+              <a:gs pos="33000">
+                <a:srgbClr val="58A8DB">
+                  <a:alpha val="80000"/>
+                </a:srgbClr>
+              </a:gs>
+              <a:gs pos="0">
+                <a:schemeClr val="accent1">
+                  <a:lumMod val="5000"/>
+                  <a:lumOff val="95000"/>
+                  <a:alpha val="60000"/>
+                </a:schemeClr>
+              </a:gs>
+              <a:gs pos="100000">
+                <a:srgbClr val="007BC8"/>
+              </a:gs>
+            </a:gsLst>
+            <a:lin ang="10800000" scaled="0"/>
+            <a:tileRect/>
+          </a:gradFill>
+          <a:ln>
+            <a:noFill/>
+          </a:ln>
+        </p:spPr>
+        <p:style>
+          <a:lnRef idx="2">
+            <a:schemeClr val="accent1">
+              <a:shade val="15000"/>
+            </a:schemeClr>
+          </a:lnRef>
+          <a:fillRef idx="1">
+            <a:schemeClr val="accent1"/>
+          </a:fillRef>
+          <a:effectRef idx="0">
+            <a:schemeClr val="accent1"/>
+          </a:effectRef>
+          <a:fontRef idx="minor">
+            <a:schemeClr val="lt1"/>
+          </a:fontRef>
+        </p:style>
+        <p:txBody>
+          <a:bodyPr rtlCol="0" anchor="ctr"/>
+          <a:lstStyle/>
+          <a:p>
+            <a:pPr algn="ctr"/>
+            <a:endParaRPr lang="ko-KR" altLang="en-US"/>
+          </a:p>
+        </p:txBody>
+      </p:sp>
+      <p:sp>
+        <p:nvSpPr>
+          <p:cNvPr id="5" name="TextBox 9">
+            <a:extLst>
+              <a:ext uri="{FF2B5EF4-FFF2-40B4-BE49-F238E27FC236}">
+                <a16:creationId xmlns:a16="http://schemas.microsoft.com/office/drawing/2014/main" id="{EE9D710B-9338-432A-6688-80F7D66D5B81}"/>
+              </a:ext>
+            </a:extLst>
+          </p:cNvPr>
+          <p:cNvSpPr txBox="1"/>
+          <p:nvPr/>
+        </p:nvSpPr>
+        <p:spPr>
+          <a:xfrm>
+            <a:off x="1055688" y="4226050"/>
+            <a:ext cx="5844149" cy="991870"/>
+          </a:xfrm>
+          <a:prstGeom prst="rect">
+            <a:avLst/>
+          </a:prstGeom>
+        </p:spPr>
+        <p:txBody>
+          <a:bodyPr lIns="0" tIns="135467" rIns="0" bIns="135467" rtlCol="0" anchor="ctr"/>
+          <a:lstStyle/>
+          <a:p>
+            <a:pPr lvl="0" algn="l">
+              <a:lnSpc>
+                <a:spcPct val="99600"/>
+              </a:lnSpc>
+            </a:pPr>
+            <a:r>
+              <a:rPr lang="ko-KR" altLang="en-US" sz="6000" b="0" i="0" u="none" strike="noStrike" spc="107" dirty="0">
+                <a:ln w="25400">
+                  <a:noFill/>
+                </a:ln>
+                <a:solidFill>
+                  <a:schemeClr val="bg1"/>
+                </a:solidFill>
+                <a:latin typeface="구름 산스 700" pitchFamily="2" charset="-127"/>
+                <a:ea typeface="구름 산스 700" pitchFamily="2" charset="-127"/>
+              </a:rPr>
+              <a:t>주제 선택 배경</a:t>
+            </a:r>
+            <a:endParaRPr lang="ko-KR" sz="6000" b="0" i="0" u="none" strike="noStrike" spc="107" dirty="0">
+              <a:ln w="25400">
+                <a:noFill/>
+              </a:ln>
+              <a:solidFill>
+                <a:schemeClr val="bg1"/>
+              </a:solidFill>
+              <a:latin typeface="구름 산스 700" pitchFamily="2" charset="-127"/>
+              <a:ea typeface="구름 산스 700" pitchFamily="2" charset="-127"/>
+            </a:endParaRPr>
+          </a:p>
+        </p:txBody>
+      </p:sp>
+      <p:sp>
+        <p:nvSpPr>
+          <p:cNvPr id="6" name="직사각형 5">
+            <a:extLst>
+              <a:ext uri="{FF2B5EF4-FFF2-40B4-BE49-F238E27FC236}">
+                <a16:creationId xmlns:a16="http://schemas.microsoft.com/office/drawing/2014/main" id="{13DC492C-566B-2A1F-43F6-822BDF339808}"/>
+              </a:ext>
+            </a:extLst>
+          </p:cNvPr>
+          <p:cNvSpPr/>
+          <p:nvPr/>
+        </p:nvSpPr>
+        <p:spPr>
+          <a:xfrm>
+            <a:off x="1055688" y="2644170"/>
+            <a:ext cx="1553630" cy="1569660"/>
+          </a:xfrm>
+          <a:prstGeom prst="rect">
+            <a:avLst/>
+          </a:prstGeom>
+          <a:noFill/>
+        </p:spPr>
+        <p:txBody>
+          <a:bodyPr wrap="none" lIns="91440" tIns="45720" rIns="91440" bIns="45720">
+            <a:spAutoFit/>
+          </a:bodyPr>
+          <a:lstStyle/>
+          <a:p>
+            <a:pPr algn="ctr"/>
+            <a:r>
+              <a:rPr lang="en-US" altLang="ko-KR" sz="9600" b="1" dirty="0">
+                <a:ln w="63500">
+                  <a:solidFill>
+                    <a:schemeClr val="bg1"/>
+                  </a:solidFill>
+                  <a:prstDash val="solid"/>
+                </a:ln>
+                <a:solidFill>
+                  <a:srgbClr val="FFFFFF"/>
+                </a:solidFill>
+                <a:effectLst>
+                  <a:outerShdw blurRad="50800" dist="88900" dir="1560000" algn="l" rotWithShape="0">
+                    <a:srgbClr val="002060">
+                      <a:alpha val="40000"/>
+                    </a:srgbClr>
+                  </a:outerShdw>
+                </a:effectLst>
+                <a:latin typeface="Pretendard ExtraBold" panose="020B0600000101010101" charset="-127"/>
+                <a:ea typeface="Pretendard ExtraBold" panose="020B0600000101010101" charset="-127"/>
+                <a:cs typeface="Malgun Gothic Semilight" panose="020B0503020000020004" pitchFamily="34" charset="-127"/>
+              </a:rPr>
+              <a:t>02</a:t>
+            </a:r>
+          </a:p>
+        </p:txBody>
+      </p:sp>
     </p:spTree>
     <p:extLst>
       <p:ext uri="{BB962C8B-B14F-4D97-AF65-F5344CB8AC3E}">
-        <p14:creationId xmlns:p14="http://schemas.microsoft.com/office/powerpoint/2010/main" val="2884144548"/>
+        <p14:creationId xmlns:p14="http://schemas.microsoft.com/office/powerpoint/2010/main" val="1172724609"/>
       </p:ext>
     </p:extLst>
   </p:cSld>
@@ -5973,6 +5729,574 @@
 </file>
 
 <file path=ppt/slides/slide5.xml><?xml version="1.0" encoding="utf-8"?>
+<p:sld xmlns:a="http://schemas.openxmlformats.org/drawingml/2006/main" xmlns:r="http://schemas.openxmlformats.org/officeDocument/2006/relationships" xmlns:p="http://schemas.openxmlformats.org/presentationml/2006/main">
+  <p:cSld>
+    <p:spTree>
+      <p:nvGrpSpPr>
+        <p:cNvPr id="1" name="">
+          <a:extLst>
+            <a:ext uri="{FF2B5EF4-FFF2-40B4-BE49-F238E27FC236}">
+              <a16:creationId xmlns:a16="http://schemas.microsoft.com/office/drawing/2014/main" id="{FEB40AD7-60B7-C3E2-B921-2590A209C585}"/>
+            </a:ext>
+          </a:extLst>
+        </p:cNvPr>
+        <p:cNvGrpSpPr/>
+        <p:nvPr/>
+      </p:nvGrpSpPr>
+      <p:grpSpPr>
+        <a:xfrm>
+          <a:off x="0" y="0"/>
+          <a:ext cx="0" cy="0"/>
+          <a:chOff x="0" y="0"/>
+          <a:chExt cx="0" cy="0"/>
+        </a:xfrm>
+      </p:grpSpPr>
+      <p:sp>
+        <p:nvSpPr>
+          <p:cNvPr id="2" name="슬라이드 번호 개체 틀 1">
+            <a:extLst>
+              <a:ext uri="{FF2B5EF4-FFF2-40B4-BE49-F238E27FC236}">
+                <a16:creationId xmlns:a16="http://schemas.microsoft.com/office/drawing/2014/main" id="{873BF5E2-06B0-B4F4-E926-D57C014895B4}"/>
+              </a:ext>
+            </a:extLst>
+          </p:cNvPr>
+          <p:cNvSpPr>
+            <a:spLocks noGrp="1"/>
+          </p:cNvSpPr>
+          <p:nvPr>
+            <p:ph type="sldNum" sz="quarter" idx="12"/>
+          </p:nvPr>
+        </p:nvSpPr>
+        <p:spPr/>
+        <p:txBody>
+          <a:bodyPr/>
+          <a:lstStyle/>
+          <a:p>
+            <a:fld id="{C5002163-FFAF-417C-9C20-DC892DFE9806}" type="slidenum">
+              <a:rPr lang="ko-KR" altLang="en-US" smtClean="0"/>
+              <a:pPr/>
+              <a:t>4</a:t>
+            </a:fld>
+            <a:endParaRPr lang="ko-KR" altLang="en-US"/>
+          </a:p>
+        </p:txBody>
+      </p:sp>
+      <p:pic>
+        <p:nvPicPr>
+          <p:cNvPr id="3" name="그림 2">
+            <a:extLst>
+              <a:ext uri="{FF2B5EF4-FFF2-40B4-BE49-F238E27FC236}">
+                <a16:creationId xmlns:a16="http://schemas.microsoft.com/office/drawing/2014/main" id="{B1E466F3-BEF3-A0C3-CE78-CEFCB5D3ABCF}"/>
+              </a:ext>
+            </a:extLst>
+          </p:cNvPr>
+          <p:cNvPicPr>
+            <a:picLocks noChangeAspect="1"/>
+          </p:cNvPicPr>
+          <p:nvPr/>
+        </p:nvPicPr>
+        <p:blipFill>
+          <a:blip r:embed="rId2"/>
+          <a:stretch>
+            <a:fillRect/>
+          </a:stretch>
+        </p:blipFill>
+        <p:spPr>
+          <a:xfrm>
+            <a:off x="15240" y="0"/>
+            <a:ext cx="12192000" cy="6858000"/>
+          </a:xfrm>
+          <a:prstGeom prst="rect">
+            <a:avLst/>
+          </a:prstGeom>
+          <a:noFill/>
+        </p:spPr>
+      </p:pic>
+      <p:sp>
+        <p:nvSpPr>
+          <p:cNvPr id="4" name="직사각형 3">
+            <a:extLst>
+              <a:ext uri="{FF2B5EF4-FFF2-40B4-BE49-F238E27FC236}">
+                <a16:creationId xmlns:a16="http://schemas.microsoft.com/office/drawing/2014/main" id="{5008DBD4-2268-84E7-3EEA-DF8679ACB903}"/>
+              </a:ext>
+            </a:extLst>
+          </p:cNvPr>
+          <p:cNvSpPr/>
+          <p:nvPr/>
+        </p:nvSpPr>
+        <p:spPr>
+          <a:xfrm>
+            <a:off x="0" y="0"/>
+            <a:ext cx="12292314" cy="6858000"/>
+          </a:xfrm>
+          <a:prstGeom prst="rect">
+            <a:avLst/>
+          </a:prstGeom>
+          <a:gradFill flip="none" rotWithShape="1">
+            <a:gsLst>
+              <a:gs pos="66000">
+                <a:srgbClr val="2C92D2">
+                  <a:alpha val="90000"/>
+                </a:srgbClr>
+              </a:gs>
+              <a:gs pos="33000">
+                <a:srgbClr val="58A8DB">
+                  <a:alpha val="80000"/>
+                </a:srgbClr>
+              </a:gs>
+              <a:gs pos="0">
+                <a:schemeClr val="accent1">
+                  <a:lumMod val="5000"/>
+                  <a:lumOff val="95000"/>
+                  <a:alpha val="60000"/>
+                </a:schemeClr>
+              </a:gs>
+              <a:gs pos="100000">
+                <a:srgbClr val="007BC8"/>
+              </a:gs>
+            </a:gsLst>
+            <a:lin ang="10800000" scaled="0"/>
+            <a:tileRect/>
+          </a:gradFill>
+          <a:ln>
+            <a:noFill/>
+          </a:ln>
+        </p:spPr>
+        <p:style>
+          <a:lnRef idx="2">
+            <a:schemeClr val="accent1">
+              <a:shade val="15000"/>
+            </a:schemeClr>
+          </a:lnRef>
+          <a:fillRef idx="1">
+            <a:schemeClr val="accent1"/>
+          </a:fillRef>
+          <a:effectRef idx="0">
+            <a:schemeClr val="accent1"/>
+          </a:effectRef>
+          <a:fontRef idx="minor">
+            <a:schemeClr val="lt1"/>
+          </a:fontRef>
+        </p:style>
+        <p:txBody>
+          <a:bodyPr rtlCol="0" anchor="ctr"/>
+          <a:lstStyle/>
+          <a:p>
+            <a:pPr algn="ctr"/>
+            <a:endParaRPr lang="ko-KR" altLang="en-US"/>
+          </a:p>
+        </p:txBody>
+      </p:sp>
+      <p:sp>
+        <p:nvSpPr>
+          <p:cNvPr id="5" name="TextBox 9">
+            <a:extLst>
+              <a:ext uri="{FF2B5EF4-FFF2-40B4-BE49-F238E27FC236}">
+                <a16:creationId xmlns:a16="http://schemas.microsoft.com/office/drawing/2014/main" id="{CBC45045-2AC7-A9F5-0305-B146A21C0833}"/>
+              </a:ext>
+            </a:extLst>
+          </p:cNvPr>
+          <p:cNvSpPr txBox="1"/>
+          <p:nvPr/>
+        </p:nvSpPr>
+        <p:spPr>
+          <a:xfrm>
+            <a:off x="1055688" y="4226050"/>
+            <a:ext cx="5844149" cy="991870"/>
+          </a:xfrm>
+          <a:prstGeom prst="rect">
+            <a:avLst/>
+          </a:prstGeom>
+        </p:spPr>
+        <p:txBody>
+          <a:bodyPr lIns="0" tIns="135467" rIns="0" bIns="135467" rtlCol="0" anchor="ctr"/>
+          <a:lstStyle/>
+          <a:p>
+            <a:pPr lvl="0" algn="l">
+              <a:lnSpc>
+                <a:spcPct val="99600"/>
+              </a:lnSpc>
+            </a:pPr>
+            <a:r>
+              <a:rPr lang="ko-KR" altLang="en-US" sz="6000" b="0" i="0" u="none" strike="noStrike" spc="107" dirty="0">
+                <a:ln w="25400">
+                  <a:noFill/>
+                </a:ln>
+                <a:solidFill>
+                  <a:schemeClr val="bg1"/>
+                </a:solidFill>
+                <a:latin typeface="구름 산스 700" pitchFamily="2" charset="-127"/>
+                <a:ea typeface="구름 산스 700" pitchFamily="2" charset="-127"/>
+              </a:rPr>
+              <a:t>주제 선택 배경</a:t>
+            </a:r>
+            <a:endParaRPr lang="ko-KR" sz="6000" b="0" i="0" u="none" strike="noStrike" spc="107" dirty="0">
+              <a:ln w="25400">
+                <a:noFill/>
+              </a:ln>
+              <a:solidFill>
+                <a:schemeClr val="bg1"/>
+              </a:solidFill>
+              <a:latin typeface="구름 산스 700" pitchFamily="2" charset="-127"/>
+              <a:ea typeface="구름 산스 700" pitchFamily="2" charset="-127"/>
+            </a:endParaRPr>
+          </a:p>
+        </p:txBody>
+      </p:sp>
+      <p:sp>
+        <p:nvSpPr>
+          <p:cNvPr id="6" name="직사각형 5">
+            <a:extLst>
+              <a:ext uri="{FF2B5EF4-FFF2-40B4-BE49-F238E27FC236}">
+                <a16:creationId xmlns:a16="http://schemas.microsoft.com/office/drawing/2014/main" id="{102C81CB-4545-205F-7430-E4C3AF4EC0AF}"/>
+              </a:ext>
+            </a:extLst>
+          </p:cNvPr>
+          <p:cNvSpPr/>
+          <p:nvPr/>
+        </p:nvSpPr>
+        <p:spPr>
+          <a:xfrm>
+            <a:off x="1055687" y="2644170"/>
+            <a:ext cx="1553631" cy="1569660"/>
+          </a:xfrm>
+          <a:prstGeom prst="rect">
+            <a:avLst/>
+          </a:prstGeom>
+          <a:noFill/>
+        </p:spPr>
+        <p:txBody>
+          <a:bodyPr wrap="none" lIns="91440" tIns="45720" rIns="91440" bIns="45720">
+            <a:spAutoFit/>
+          </a:bodyPr>
+          <a:lstStyle/>
+          <a:p>
+            <a:pPr algn="ctr"/>
+            <a:r>
+              <a:rPr lang="en-US" altLang="ko-KR" sz="9600" b="1" dirty="0">
+                <a:ln w="63500">
+                  <a:solidFill>
+                    <a:schemeClr val="bg1"/>
+                  </a:solidFill>
+                  <a:prstDash val="solid"/>
+                </a:ln>
+                <a:solidFill>
+                  <a:srgbClr val="FFFFFF"/>
+                </a:solidFill>
+                <a:effectLst>
+                  <a:outerShdw blurRad="50800" dist="88900" dir="1560000" algn="l" rotWithShape="0">
+                    <a:srgbClr val="002060">
+                      <a:alpha val="40000"/>
+                    </a:srgbClr>
+                  </a:outerShdw>
+                </a:effectLst>
+                <a:latin typeface="Pretendard ExtraBold" panose="020B0600000101010101" charset="-127"/>
+                <a:ea typeface="Pretendard ExtraBold" panose="020B0600000101010101" charset="-127"/>
+                <a:cs typeface="Malgun Gothic Semilight" panose="020B0503020000020004" pitchFamily="34" charset="-127"/>
+              </a:rPr>
+              <a:t>03</a:t>
+            </a:r>
+          </a:p>
+        </p:txBody>
+      </p:sp>
+    </p:spTree>
+    <p:extLst>
+      <p:ext uri="{BB962C8B-B14F-4D97-AF65-F5344CB8AC3E}">
+        <p14:creationId xmlns:p14="http://schemas.microsoft.com/office/powerpoint/2010/main" val="2100492466"/>
+      </p:ext>
+    </p:extLst>
+  </p:cSld>
+  <p:clrMapOvr>
+    <a:masterClrMapping/>
+  </p:clrMapOvr>
+</p:sld>
+</file>
+
+<file path=ppt/slides/slide6.xml><?xml version="1.0" encoding="utf-8"?>
+<p:sld xmlns:a="http://schemas.openxmlformats.org/drawingml/2006/main" xmlns:r="http://schemas.openxmlformats.org/officeDocument/2006/relationships" xmlns:p="http://schemas.openxmlformats.org/presentationml/2006/main">
+  <p:cSld>
+    <p:spTree>
+      <p:nvGrpSpPr>
+        <p:cNvPr id="1" name="">
+          <a:extLst>
+            <a:ext uri="{FF2B5EF4-FFF2-40B4-BE49-F238E27FC236}">
+              <a16:creationId xmlns:a16="http://schemas.microsoft.com/office/drawing/2014/main" id="{19C5214B-6EE2-773F-9863-73027DFD61A0}"/>
+            </a:ext>
+          </a:extLst>
+        </p:cNvPr>
+        <p:cNvGrpSpPr/>
+        <p:nvPr/>
+      </p:nvGrpSpPr>
+      <p:grpSpPr>
+        <a:xfrm>
+          <a:off x="0" y="0"/>
+          <a:ext cx="0" cy="0"/>
+          <a:chOff x="0" y="0"/>
+          <a:chExt cx="0" cy="0"/>
+        </a:xfrm>
+      </p:grpSpPr>
+      <p:sp>
+        <p:nvSpPr>
+          <p:cNvPr id="2" name="슬라이드 번호 개체 틀 1">
+            <a:extLst>
+              <a:ext uri="{FF2B5EF4-FFF2-40B4-BE49-F238E27FC236}">
+                <a16:creationId xmlns:a16="http://schemas.microsoft.com/office/drawing/2014/main" id="{4FA251B4-9DE1-3AE2-6E93-9A1B34A7126F}"/>
+              </a:ext>
+            </a:extLst>
+          </p:cNvPr>
+          <p:cNvSpPr>
+            <a:spLocks noGrp="1"/>
+          </p:cNvSpPr>
+          <p:nvPr>
+            <p:ph type="sldNum" sz="quarter" idx="12"/>
+          </p:nvPr>
+        </p:nvSpPr>
+        <p:spPr/>
+        <p:txBody>
+          <a:bodyPr/>
+          <a:lstStyle/>
+          <a:p>
+            <a:fld id="{C5002163-FFAF-417C-9C20-DC892DFE9806}" type="slidenum">
+              <a:rPr lang="ko-KR" altLang="en-US" smtClean="0"/>
+              <a:pPr/>
+              <a:t>5</a:t>
+            </a:fld>
+            <a:endParaRPr lang="ko-KR" altLang="en-US"/>
+          </a:p>
+        </p:txBody>
+      </p:sp>
+      <p:pic>
+        <p:nvPicPr>
+          <p:cNvPr id="3" name="그림 2">
+            <a:extLst>
+              <a:ext uri="{FF2B5EF4-FFF2-40B4-BE49-F238E27FC236}">
+                <a16:creationId xmlns:a16="http://schemas.microsoft.com/office/drawing/2014/main" id="{EB17C367-E437-E807-1BF1-006D00B2B171}"/>
+              </a:ext>
+            </a:extLst>
+          </p:cNvPr>
+          <p:cNvPicPr>
+            <a:picLocks noChangeAspect="1"/>
+          </p:cNvPicPr>
+          <p:nvPr/>
+        </p:nvPicPr>
+        <p:blipFill>
+          <a:blip r:embed="rId2"/>
+          <a:stretch>
+            <a:fillRect/>
+          </a:stretch>
+        </p:blipFill>
+        <p:spPr>
+          <a:xfrm>
+            <a:off x="15240" y="0"/>
+            <a:ext cx="12192000" cy="6858000"/>
+          </a:xfrm>
+          <a:prstGeom prst="rect">
+            <a:avLst/>
+          </a:prstGeom>
+          <a:noFill/>
+        </p:spPr>
+      </p:pic>
+      <p:sp>
+        <p:nvSpPr>
+          <p:cNvPr id="4" name="직사각형 3">
+            <a:extLst>
+              <a:ext uri="{FF2B5EF4-FFF2-40B4-BE49-F238E27FC236}">
+                <a16:creationId xmlns:a16="http://schemas.microsoft.com/office/drawing/2014/main" id="{7BBD5C73-A7D7-A68E-60D3-C905AAD7BB55}"/>
+              </a:ext>
+            </a:extLst>
+          </p:cNvPr>
+          <p:cNvSpPr/>
+          <p:nvPr/>
+        </p:nvSpPr>
+        <p:spPr>
+          <a:xfrm>
+            <a:off x="0" y="0"/>
+            <a:ext cx="12292314" cy="6858000"/>
+          </a:xfrm>
+          <a:prstGeom prst="rect">
+            <a:avLst/>
+          </a:prstGeom>
+          <a:gradFill flip="none" rotWithShape="1">
+            <a:gsLst>
+              <a:gs pos="66000">
+                <a:srgbClr val="2C92D2">
+                  <a:alpha val="90000"/>
+                </a:srgbClr>
+              </a:gs>
+              <a:gs pos="33000">
+                <a:srgbClr val="58A8DB">
+                  <a:alpha val="80000"/>
+                </a:srgbClr>
+              </a:gs>
+              <a:gs pos="0">
+                <a:schemeClr val="accent1">
+                  <a:lumMod val="5000"/>
+                  <a:lumOff val="95000"/>
+                  <a:alpha val="60000"/>
+                </a:schemeClr>
+              </a:gs>
+              <a:gs pos="100000">
+                <a:srgbClr val="007BC8"/>
+              </a:gs>
+            </a:gsLst>
+            <a:lin ang="10800000" scaled="0"/>
+            <a:tileRect/>
+          </a:gradFill>
+          <a:ln>
+            <a:noFill/>
+          </a:ln>
+        </p:spPr>
+        <p:style>
+          <a:lnRef idx="2">
+            <a:schemeClr val="accent1">
+              <a:shade val="15000"/>
+            </a:schemeClr>
+          </a:lnRef>
+          <a:fillRef idx="1">
+            <a:schemeClr val="accent1"/>
+          </a:fillRef>
+          <a:effectRef idx="0">
+            <a:schemeClr val="accent1"/>
+          </a:effectRef>
+          <a:fontRef idx="minor">
+            <a:schemeClr val="lt1"/>
+          </a:fontRef>
+        </p:style>
+        <p:txBody>
+          <a:bodyPr rtlCol="0" anchor="ctr"/>
+          <a:lstStyle/>
+          <a:p>
+            <a:pPr algn="ctr"/>
+            <a:endParaRPr lang="ko-KR" altLang="en-US"/>
+          </a:p>
+        </p:txBody>
+      </p:sp>
+      <p:sp>
+        <p:nvSpPr>
+          <p:cNvPr id="5" name="TextBox 9">
+            <a:extLst>
+              <a:ext uri="{FF2B5EF4-FFF2-40B4-BE49-F238E27FC236}">
+                <a16:creationId xmlns:a16="http://schemas.microsoft.com/office/drawing/2014/main" id="{C9378B55-3B4D-8607-E8DC-9773153AB500}"/>
+              </a:ext>
+            </a:extLst>
+          </p:cNvPr>
+          <p:cNvSpPr txBox="1"/>
+          <p:nvPr/>
+        </p:nvSpPr>
+        <p:spPr>
+          <a:xfrm>
+            <a:off x="1055688" y="4226050"/>
+            <a:ext cx="5844149" cy="991870"/>
+          </a:xfrm>
+          <a:prstGeom prst="rect">
+            <a:avLst/>
+          </a:prstGeom>
+        </p:spPr>
+        <p:txBody>
+          <a:bodyPr lIns="0" tIns="135467" rIns="0" bIns="135467" rtlCol="0" anchor="ctr"/>
+          <a:lstStyle/>
+          <a:p>
+            <a:pPr lvl="0" algn="l">
+              <a:lnSpc>
+                <a:spcPct val="99600"/>
+              </a:lnSpc>
+            </a:pPr>
+            <a:r>
+              <a:rPr lang="ko-KR" altLang="en-US" sz="6000" b="0" i="0" u="none" strike="noStrike" spc="107" dirty="0">
+                <a:ln w="25400">
+                  <a:noFill/>
+                </a:ln>
+                <a:solidFill>
+                  <a:schemeClr val="bg1"/>
+                </a:solidFill>
+                <a:latin typeface="구름 산스 700" pitchFamily="2" charset="-127"/>
+                <a:ea typeface="구름 산스 700" pitchFamily="2" charset="-127"/>
+              </a:rPr>
+              <a:t>주제 선택 배경</a:t>
+            </a:r>
+            <a:endParaRPr lang="ko-KR" sz="6000" b="0" i="0" u="none" strike="noStrike" spc="107" dirty="0">
+              <a:ln w="25400">
+                <a:noFill/>
+              </a:ln>
+              <a:solidFill>
+                <a:schemeClr val="bg1"/>
+              </a:solidFill>
+              <a:latin typeface="구름 산스 700" pitchFamily="2" charset="-127"/>
+              <a:ea typeface="구름 산스 700" pitchFamily="2" charset="-127"/>
+            </a:endParaRPr>
+          </a:p>
+        </p:txBody>
+      </p:sp>
+      <p:sp>
+        <p:nvSpPr>
+          <p:cNvPr id="6" name="직사각형 5">
+            <a:extLst>
+              <a:ext uri="{FF2B5EF4-FFF2-40B4-BE49-F238E27FC236}">
+                <a16:creationId xmlns:a16="http://schemas.microsoft.com/office/drawing/2014/main" id="{E25FCA37-B4FF-9E17-DDCB-85DD887756C1}"/>
+              </a:ext>
+            </a:extLst>
+          </p:cNvPr>
+          <p:cNvSpPr/>
+          <p:nvPr/>
+        </p:nvSpPr>
+        <p:spPr>
+          <a:xfrm>
+            <a:off x="1055687" y="2644170"/>
+            <a:ext cx="1553631" cy="1569660"/>
+          </a:xfrm>
+          <a:prstGeom prst="rect">
+            <a:avLst/>
+          </a:prstGeom>
+          <a:noFill/>
+        </p:spPr>
+        <p:txBody>
+          <a:bodyPr wrap="none" lIns="91440" tIns="45720" rIns="91440" bIns="45720">
+            <a:spAutoFit/>
+          </a:bodyPr>
+          <a:lstStyle/>
+          <a:p>
+            <a:pPr algn="ctr"/>
+            <a:r>
+              <a:rPr lang="en-US" altLang="ko-KR" sz="9600" b="1" dirty="0">
+                <a:ln w="63500">
+                  <a:solidFill>
+                    <a:schemeClr val="bg1"/>
+                  </a:solidFill>
+                  <a:prstDash val="solid"/>
+                </a:ln>
+                <a:solidFill>
+                  <a:srgbClr val="FFFFFF"/>
+                </a:solidFill>
+                <a:effectLst>
+                  <a:outerShdw blurRad="50800" dist="88900" dir="1560000" algn="l" rotWithShape="0">
+                    <a:srgbClr val="002060">
+                      <a:alpha val="40000"/>
+                    </a:srgbClr>
+                  </a:outerShdw>
+                </a:effectLst>
+                <a:latin typeface="Pretendard ExtraBold" panose="020B0600000101010101" charset="-127"/>
+                <a:ea typeface="Pretendard ExtraBold" panose="020B0600000101010101" charset="-127"/>
+                <a:cs typeface="Malgun Gothic Semilight" panose="020B0503020000020004" pitchFamily="34" charset="-127"/>
+              </a:rPr>
+              <a:t>04</a:t>
+            </a:r>
+          </a:p>
+        </p:txBody>
+      </p:sp>
+    </p:spTree>
+    <p:extLst>
+      <p:ext uri="{BB962C8B-B14F-4D97-AF65-F5344CB8AC3E}">
+        <p14:creationId xmlns:p14="http://schemas.microsoft.com/office/powerpoint/2010/main" val="2486295478"/>
+      </p:ext>
+    </p:extLst>
+  </p:cSld>
+  <p:clrMapOvr>
+    <a:masterClrMapping/>
+  </p:clrMapOvr>
+</p:sld>
+</file>
+
+<file path=ppt/slides/slide7.xml><?xml version="1.0" encoding="utf-8"?>
 <p:sld xmlns:a="http://schemas.openxmlformats.org/drawingml/2006/main" xmlns:r="http://schemas.openxmlformats.org/officeDocument/2006/relationships" xmlns:p="http://schemas.openxmlformats.org/presentationml/2006/main">
   <p:cSld>
     <p:spTree>
@@ -5994,7 +6318,7 @@
           <p:cNvPr id="2" name="슬라이드 번호 개체 틀 1">
             <a:extLst>
               <a:ext uri="{FF2B5EF4-FFF2-40B4-BE49-F238E27FC236}">
-                <a16:creationId xmlns:a16="http://schemas.microsoft.com/office/drawing/2014/main" id="{0B723176-34AE-2EA8-FA78-AC69A4228425}"/>
+                <a16:creationId xmlns:a16="http://schemas.microsoft.com/office/drawing/2014/main" id="{4D94C39E-62F0-FA7C-3272-6C6CBEC3C81B}"/>
               </a:ext>
             </a:extLst>
           </p:cNvPr>
@@ -6013,16 +6337,16 @@
             <a:fld id="{C5002163-FFAF-417C-9C20-DC892DFE9806}" type="slidenum">
               <a:rPr lang="ko-KR" altLang="en-US" smtClean="0"/>
               <a:pPr/>
-              <a:t>4</a:t>
+              <a:t>6</a:t>
             </a:fld>
-            <a:endParaRPr lang="ko-KR" altLang="en-US"/>
+            <a:endParaRPr lang="ko-KR" altLang="en-US" dirty="0"/>
           </a:p>
         </p:txBody>
       </p:sp>
     </p:spTree>
     <p:extLst>
       <p:ext uri="{BB962C8B-B14F-4D97-AF65-F5344CB8AC3E}">
-        <p14:creationId xmlns:p14="http://schemas.microsoft.com/office/powerpoint/2010/main" val="3411328053"/>
+        <p14:creationId xmlns:p14="http://schemas.microsoft.com/office/powerpoint/2010/main" val="1422414358"/>
       </p:ext>
     </p:extLst>
   </p:cSld>

</xml_diff>